<commit_message>
correct typo/computation error on slide 12
</commit_message>
<xml_diff>
--- a/Slides-RPR/2019-H1-DAA-L32-DynProg-MultiStage-Graphs.pptx
+++ b/Slides-RPR/2019-H1-DAA-L32-DynProg-MultiStage-Graphs.pptx
@@ -6136,7 +6136,7 @@
                 <a:cs typeface="Arial"/>
                 <a:sym typeface="Arial"/>
               </a:rPr>
-              <a:t>+4+6=11</a:t>
+              <a:t>+4+5=11</a:t>
             </a:r>
           </a:p>
           <a:p>
@@ -16585,8 +16585,8 @@
         </p:nvSpPr>
         <p:spPr>
           <a:xfrm>
-            <a:off x="6749544" y="4422777"/>
-            <a:ext cx="324457" cy="447230"/>
+            <a:off x="6749544" y="4422778"/>
+            <a:ext cx="324456" cy="447229"/>
           </a:xfrm>
           <a:prstGeom prst="rect">
             <a:avLst/>
@@ -17021,8 +17021,8 @@
         </p:nvSpPr>
         <p:spPr>
           <a:xfrm>
-            <a:off x="3713213" y="4197335"/>
-            <a:ext cx="1641831" cy="1835355"/>
+            <a:off x="3713214" y="4197335"/>
+            <a:ext cx="1641830" cy="1835355"/>
           </a:xfrm>
           <a:prstGeom prst="line">
             <a:avLst/>
@@ -17177,7 +17177,7 @@
         <p:spPr>
           <a:xfrm>
             <a:off x="3994633" y="5165089"/>
-            <a:ext cx="1329479" cy="975821"/>
+            <a:ext cx="1329480" cy="975821"/>
           </a:xfrm>
           <a:prstGeom prst="line">
             <a:avLst/>
@@ -17304,7 +17304,7 @@
         </p:nvSpPr>
         <p:spPr>
           <a:xfrm>
-            <a:off x="3975252" y="6108816"/>
+            <a:off x="3975252" y="6108815"/>
             <a:ext cx="1385995" cy="1"/>
           </a:xfrm>
           <a:prstGeom prst="line">
@@ -21420,85 +21420,85 @@
       </p:par>
     </p:tnLst>
     <p:bldLst>
+      <p:bldP build="whole" bldLvl="1" animBg="1" rev="0" advAuto="0" spid="387" grpId="4"/>
+      <p:bldP build="whole" bldLvl="1" animBg="1" rev="0" advAuto="0" spid="424" grpId="33"/>
+      <p:bldP build="whole" bldLvl="1" animBg="1" rev="0" advAuto="0" spid="400" grpId="3"/>
+      <p:bldP build="whole" bldLvl="1" animBg="1" rev="0" advAuto="0" spid="421" grpId="30"/>
+      <p:bldP build="whole" bldLvl="1" animBg="1" rev="0" advAuto="0" spid="461" grpId="65"/>
+      <p:bldP build="whole" bldLvl="1" animBg="1" rev="0" advAuto="0" spid="458" grpId="59"/>
+      <p:bldP build="whole" bldLvl="1" animBg="1" rev="0" advAuto="0" spid="458" grpId="60"/>
+      <p:bldP build="whole" bldLvl="1" animBg="1" rev="0" advAuto="0" spid="435" grpId="57"/>
+      <p:bldP build="whole" bldLvl="1" animBg="1" rev="0" advAuto="0" spid="452" grpId="27"/>
+      <p:bldP build="whole" bldLvl="1" animBg="1" rev="0" advAuto="0" spid="452" grpId="28"/>
+      <p:bldP build="whole" bldLvl="1" animBg="1" rev="0" advAuto="0" spid="454" grpId="44"/>
+      <p:bldP build="whole" bldLvl="1" animBg="1" rev="0" advAuto="0" spid="435" grpId="58"/>
+      <p:bldP build="whole" bldLvl="1" animBg="1" rev="0" advAuto="0" spid="459" grpId="61"/>
+      <p:bldP build="whole" bldLvl="1" animBg="1" rev="0" advAuto="0" spid="459" grpId="62"/>
+      <p:bldP build="whole" bldLvl="1" animBg="1" rev="0" advAuto="0" spid="448" grpId="66"/>
+      <p:bldP build="whole" bldLvl="1" animBg="1" rev="0" advAuto="0" spid="438" grpId="70"/>
+      <p:bldP build="whole" bldLvl="1" animBg="1" rev="0" advAuto="0" spid="411" grpId="18"/>
+      <p:bldP build="whole" bldLvl="1" animBg="1" rev="0" advAuto="0" spid="406" grpId="9"/>
+      <p:bldP build="whole" bldLvl="1" animBg="1" rev="0" advAuto="0" spid="425" grpId="34"/>
+      <p:bldP build="whole" bldLvl="1" animBg="1" rev="0" advAuto="0" spid="419" grpId="26"/>
+      <p:bldP build="whole" bldLvl="1" animBg="1" rev="0" advAuto="0" spid="451" grpId="36"/>
+      <p:bldP build="whole" bldLvl="1" animBg="1" rev="0" advAuto="0" spid="388" grpId="6"/>
+      <p:bldP build="whole" bldLvl="1" animBg="1" rev="0" advAuto="0" spid="410" grpId="17"/>
+      <p:bldP build="whole" bldLvl="1" animBg="1" rev="0" advAuto="0" spid="453" grpId="79"/>
+      <p:bldP build="whole" bldLvl="1" animBg="1" rev="0" advAuto="0" spid="441" grpId="73"/>
+      <p:bldP build="whole" bldLvl="1" animBg="1" rev="0" advAuto="0" spid="415" grpId="22"/>
+      <p:bldP build="whole" bldLvl="1" animBg="1" rev="0" advAuto="0" spid="436" grpId="68"/>
+      <p:bldP build="whole" bldLvl="1" animBg="1" rev="0" advAuto="0" spid="395" grpId="16"/>
+      <p:bldP build="whole" bldLvl="1" animBg="1" rev="0" advAuto="0" spid="431" grpId="41"/>
+      <p:bldP build="whole" bldLvl="1" animBg="1" rev="0" advAuto="0" spid="380" grpId="39"/>
+      <p:bldP build="whole" bldLvl="1" animBg="1" rev="0" advAuto="0" spid="380" grpId="40"/>
+      <p:bldP build="whole" bldLvl="1" animBg="1" rev="0" advAuto="0" spid="409" grpId="11"/>
+      <p:bldP build="whole" bldLvl="1" animBg="1" rev="0" advAuto="0" spid="439" grpId="71"/>
+      <p:bldP build="whole" bldLvl="1" animBg="1" rev="0" advAuto="0" spid="412" grpId="19"/>
+      <p:bldP build="whole" bldLvl="1" animBg="1" rev="0" advAuto="0" spid="390" grpId="10"/>
+      <p:bldP build="whole" bldLvl="1" animBg="1" rev="0" advAuto="0" spid="462" grpId="51"/>
       <p:bldP build="whole" bldLvl="1" animBg="1" rev="0" advAuto="0" spid="462" grpId="52"/>
-      <p:bldP build="whole" bldLvl="1" animBg="1" rev="0" advAuto="0" spid="391" grpId="12"/>
-      <p:bldP build="whole" bldLvl="1" animBg="1" rev="0" advAuto="0" spid="410" grpId="17"/>
-      <p:bldP build="whole" bldLvl="1" animBg="1" rev="0" advAuto="0" spid="436" grpId="68"/>
-      <p:bldP build="whole" bldLvl="1" animBg="1" rev="0" advAuto="0" spid="396" grpId="67"/>
+      <p:bldP build="whole" bldLvl="1" animBg="1" rev="0" advAuto="0" spid="389" grpId="8"/>
+      <p:bldP build="whole" bldLvl="1" animBg="1" rev="0" advAuto="0" spid="440" grpId="72"/>
+      <p:bldP build="whole" bldLvl="1" animBg="1" rev="0" advAuto="0" spid="426" grpId="37"/>
+      <p:bldP build="whole" bldLvl="1" animBg="1" rev="0" advAuto="0" spid="426" grpId="38"/>
+      <p:bldP build="whole" bldLvl="1" animBg="1" rev="0" advAuto="0" spid="460" grpId="63"/>
+      <p:bldP build="whole" bldLvl="1" animBg="1" rev="0" advAuto="0" spid="392" grpId="13"/>
+      <p:bldP build="whole" bldLvl="1" animBg="1" rev="0" advAuto="0" spid="460" grpId="64"/>
+      <p:bldP build="whole" bldLvl="1" animBg="1" rev="0" advAuto="0" spid="394" grpId="15"/>
+      <p:bldP build="whole" bldLvl="1" animBg="1" rev="0" advAuto="0" spid="418" grpId="25"/>
+      <p:bldP build="whole" bldLvl="1" animBg="1" rev="0" advAuto="0" spid="393" grpId="14"/>
+      <p:bldP build="whole" bldLvl="1" animBg="1" rev="0" advAuto="0" spid="437" grpId="69"/>
       <p:bldP build="whole" bldLvl="1" animBg="1" rev="0" advAuto="0" spid="445" grpId="77"/>
-      <p:bldP build="whole" bldLvl="1" animBg="1" rev="0" advAuto="0" spid="392" grpId="13"/>
-      <p:bldP build="whole" bldLvl="1" animBg="1" rev="0" advAuto="0" spid="386" grpId="2"/>
-      <p:bldP build="whole" bldLvl="1" animBg="1" rev="0" advAuto="0" spid="388" grpId="6"/>
       <p:bldP build="whole" bldLvl="1" animBg="1" rev="0" advAuto="0" spid="433" grpId="47"/>
       <p:bldP build="whole" bldLvl="1" animBg="1" rev="0" advAuto="0" spid="433" grpId="48"/>
-      <p:bldP build="whole" bldLvl="1" animBg="1" rev="0" advAuto="0" spid="423" grpId="32"/>
-      <p:bldP build="whole" bldLvl="1" animBg="1" rev="0" advAuto="0" spid="435" grpId="57"/>
-      <p:bldP build="whole" bldLvl="1" animBg="1" rev="0" advAuto="0" spid="435" grpId="58"/>
-      <p:bldP build="whole" bldLvl="1" animBg="1" rev="0" advAuto="0" spid="453" grpId="45"/>
-      <p:bldP build="whole" bldLvl="1" animBg="1" rev="0" advAuto="0" spid="380" grpId="39"/>
-      <p:bldP build="whole" bldLvl="1" animBg="1" rev="0" advAuto="0" spid="380" grpId="40"/>
-      <p:bldP build="whole" bldLvl="1" animBg="1" rev="0" advAuto="0" spid="406" grpId="9"/>
-      <p:bldP build="whole" bldLvl="1" animBg="1" rev="0" advAuto="0" spid="418" grpId="25"/>
-      <p:bldP build="whole" bldLvl="1" animBg="1" rev="0" advAuto="0" spid="451" grpId="36"/>
+      <p:bldP build="whole" bldLvl="1" animBg="1" rev="0" advAuto="0" spid="422" grpId="31"/>
+      <p:bldP build="whole" bldLvl="1" animBg="1" rev="0" advAuto="0" spid="432" grpId="46"/>
+      <p:bldP build="whole" bldLvl="1" animBg="1" rev="0" advAuto="0" spid="397" grpId="1"/>
+      <p:bldP build="whole" bldLvl="1" animBg="1" rev="0" advAuto="0" spid="391" grpId="12"/>
+      <p:bldP build="whole" bldLvl="1" animBg="1" rev="0" advAuto="0" spid="403" grpId="7"/>
       <p:bldP build="whole" bldLvl="1" animBg="1" rev="0" advAuto="0" spid="442" grpId="74"/>
-      <p:bldP build="whole" bldLvl="1" animBg="1" rev="0" advAuto="0" spid="426" grpId="37"/>
-      <p:bldP build="whole" bldLvl="1" animBg="1" rev="0" advAuto="0" spid="426" grpId="38"/>
-      <p:bldP build="whole" bldLvl="1" animBg="1" rev="0" advAuto="0" spid="412" grpId="19"/>
-      <p:bldP build="whole" bldLvl="1" animBg="1" rev="0" advAuto="0" spid="457" grpId="55"/>
-      <p:bldP build="whole" bldLvl="1" animBg="1" rev="0" advAuto="0" spid="424" grpId="33"/>
-      <p:bldP build="whole" bldLvl="1" animBg="1" rev="0" advAuto="0" spid="461" grpId="65"/>
-      <p:bldP build="whole" bldLvl="1" animBg="1" rev="0" advAuto="0" spid="448" grpId="66"/>
-      <p:bldP build="whole" bldLvl="1" animBg="1" rev="0" advAuto="0" spid="389" grpId="8"/>
-      <p:bldP build="whole" bldLvl="1" animBg="1" rev="0" advAuto="0" spid="415" grpId="22"/>
-      <p:bldP build="whole" bldLvl="1" animBg="1" rev="0" advAuto="0" spid="437" grpId="69"/>
+      <p:bldP build="whole" bldLvl="1" animBg="1" rev="0" advAuto="0" spid="447" grpId="56"/>
+      <p:bldP build="whole" bldLvl="1" animBg="1" rev="0" advAuto="0" spid="455" grpId="53"/>
+      <p:bldP build="whole" bldLvl="1" animBg="1" rev="0" advAuto="0" spid="446" grpId="35"/>
+      <p:bldP build="whole" bldLvl="1" animBg="1" rev="0" advAuto="0" spid="396" grpId="67"/>
+      <p:bldP build="whole" bldLvl="1" animBg="1" rev="0" advAuto="0" spid="386" grpId="2"/>
+      <p:bldP build="whole" bldLvl="1" animBg="1" rev="0" advAuto="0" spid="443" grpId="75"/>
       <p:bldP build="whole" bldLvl="1" animBg="1" rev="0" advAuto="0" spid="427" grpId="42"/>
-      <p:bldP build="whole" bldLvl="1" animBg="1" rev="0" advAuto="0" spid="417" grpId="24"/>
-      <p:bldP build="whole" bldLvl="1" animBg="1" rev="0" advAuto="0" spid="421" grpId="30"/>
-      <p:bldP build="whole" bldLvl="1" animBg="1" rev="0" advAuto="0" spid="452" grpId="27"/>
-      <p:bldP build="whole" bldLvl="1" animBg="1" rev="0" advAuto="0" spid="452" grpId="28"/>
-      <p:bldP build="whole" bldLvl="1" animBg="1" rev="0" advAuto="0" spid="453" grpId="79"/>
-      <p:bldP build="whole" bldLvl="1" animBg="1" rev="0" advAuto="0" spid="458" grpId="59"/>
-      <p:bldP build="whole" bldLvl="1" animBg="1" rev="0" advAuto="0" spid="458" grpId="60"/>
-      <p:bldP build="whole" bldLvl="1" animBg="1" rev="0" advAuto="0" spid="420" grpId="29"/>
+      <p:bldP build="whole" bldLvl="1" animBg="1" rev="0" advAuto="0" spid="444" grpId="76"/>
       <p:bldP build="whole" bldLvl="1" animBg="1" rev="0" advAuto="0" spid="413" grpId="20"/>
-      <p:bldP build="whole" bldLvl="1" animBg="1" rev="0" advAuto="0" spid="460" grpId="63"/>
-      <p:bldP build="whole" bldLvl="1" animBg="1" rev="0" advAuto="0" spid="400" grpId="3"/>
-      <p:bldP build="whole" bldLvl="1" animBg="1" rev="0" advAuto="0" spid="460" grpId="64"/>
-      <p:bldP build="whole" bldLvl="1" animBg="1" rev="0" advAuto="0" spid="439" grpId="71"/>
-      <p:bldP build="whole" bldLvl="1" animBg="1" rev="0" advAuto="0" spid="393" grpId="14"/>
-      <p:bldP build="whole" bldLvl="1" animBg="1" rev="0" advAuto="0" spid="394" grpId="15"/>
-      <p:bldP build="whole" bldLvl="1" animBg="1" rev="0" advAuto="0" spid="403" grpId="7"/>
-      <p:bldP build="whole" bldLvl="1" animBg="1" rev="0" advAuto="0" spid="456" grpId="54"/>
-      <p:bldP build="whole" bldLvl="1" animBg="1" rev="0" advAuto="0" spid="395" grpId="16"/>
-      <p:bldP build="whole" bldLvl="1" animBg="1" rev="0" advAuto="0" spid="409" grpId="11"/>
-      <p:bldP build="whole" bldLvl="1" animBg="1" rev="0" advAuto="0" spid="411" grpId="18"/>
-      <p:bldP build="whole" bldLvl="1" animBg="1" rev="0" advAuto="0" spid="447" grpId="56"/>
-      <p:bldP build="whole" bldLvl="1" animBg="1" rev="0" advAuto="0" spid="441" grpId="73"/>
-      <p:bldP build="whole" bldLvl="1" animBg="1" rev="0" advAuto="0" spid="450" grpId="78"/>
       <p:bldP build="whole" bldLvl="1" animBg="1" rev="0" advAuto="0" spid="430" grpId="5"/>
-      <p:bldP build="whole" bldLvl="1" animBg="1" rev="0" advAuto="0" spid="387" grpId="4"/>
-      <p:bldP build="whole" bldLvl="1" animBg="1" rev="0" advAuto="0" spid="416" grpId="23"/>
-      <p:bldP build="whole" bldLvl="1" animBg="1" rev="0" advAuto="0" spid="449" grpId="43"/>
-      <p:bldP build="whole" bldLvl="1" animBg="1" rev="0" advAuto="0" spid="390" grpId="10"/>
-      <p:bldP build="whole" bldLvl="1" animBg="1" rev="0" advAuto="0" spid="414" grpId="21"/>
-      <p:bldP build="whole" bldLvl="1" animBg="1" rev="0" advAuto="0" spid="422" grpId="31"/>
-      <p:bldP build="whole" bldLvl="1" animBg="1" rev="0" advAuto="0" spid="446" grpId="35"/>
-      <p:bldP build="whole" bldLvl="1" animBg="1" rev="0" advAuto="0" spid="454" grpId="44"/>
-      <p:bldP build="whole" bldLvl="1" animBg="1" rev="0" advAuto="0" spid="431" grpId="41"/>
-      <p:bldP build="whole" bldLvl="1" animBg="1" rev="0" advAuto="0" spid="432" grpId="46"/>
-      <p:bldP build="whole" bldLvl="1" animBg="1" rev="0" advAuto="0" spid="455" grpId="53"/>
-      <p:bldP build="whole" bldLvl="1" animBg="1" rev="0" advAuto="0" spid="440" grpId="72"/>
-      <p:bldP build="whole" bldLvl="1" animBg="1" rev="0" advAuto="0" spid="443" grpId="75"/>
-      <p:bldP build="whole" bldLvl="1" animBg="1" rev="0" advAuto="0" spid="419" grpId="26"/>
-      <p:bldP build="whole" bldLvl="1" animBg="1" rev="0" advAuto="0" spid="397" grpId="1"/>
       <p:bldP build="whole" bldLvl="1" animBg="1" rev="0" advAuto="0" spid="434" grpId="49"/>
       <p:bldP build="whole" bldLvl="1" animBg="1" rev="0" advAuto="0" spid="434" grpId="50"/>
-      <p:bldP build="whole" bldLvl="1" animBg="1" rev="0" advAuto="0" spid="459" grpId="61"/>
-      <p:bldP build="whole" bldLvl="1" animBg="1" rev="0" advAuto="0" spid="459" grpId="62"/>
-      <p:bldP build="whole" bldLvl="1" animBg="1" rev="0" advAuto="0" spid="444" grpId="76"/>
-      <p:bldP build="whole" bldLvl="1" animBg="1" rev="0" advAuto="0" spid="425" grpId="34"/>
-      <p:bldP build="whole" bldLvl="1" animBg="1" rev="0" advAuto="0" spid="438" grpId="70"/>
-      <p:bldP build="whole" bldLvl="1" animBg="1" rev="0" advAuto="0" spid="462" grpId="51"/>
+      <p:bldP build="whole" bldLvl="1" animBg="1" rev="0" advAuto="0" spid="456" grpId="54"/>
+      <p:bldP build="whole" bldLvl="1" animBg="1" rev="0" advAuto="0" spid="449" grpId="43"/>
+      <p:bldP build="whole" bldLvl="1" animBg="1" rev="0" advAuto="0" spid="423" grpId="32"/>
+      <p:bldP build="whole" bldLvl="1" animBg="1" rev="0" advAuto="0" spid="420" grpId="29"/>
+      <p:bldP build="whole" bldLvl="1" animBg="1" rev="0" advAuto="0" spid="457" grpId="55"/>
+      <p:bldP build="whole" bldLvl="1" animBg="1" rev="0" advAuto="0" spid="450" grpId="78"/>
+      <p:bldP build="whole" bldLvl="1" animBg="1" rev="0" advAuto="0" spid="453" grpId="45"/>
+      <p:bldP build="whole" bldLvl="1" animBg="1" rev="0" advAuto="0" spid="417" grpId="24"/>
+      <p:bldP build="whole" bldLvl="1" animBg="1" rev="0" advAuto="0" spid="414" grpId="21"/>
+      <p:bldP build="whole" bldLvl="1" animBg="1" rev="0" advAuto="0" spid="416" grpId="23"/>
     </p:bldLst>
   </p:timing>
 </p:sld>
@@ -30727,19 +30727,19 @@
       </p:par>
     </p:tnLst>
     <p:bldLst>
+      <p:bldP build="whole" bldLvl="1" animBg="1" rev="0" advAuto="0" spid="90" grpId="4"/>
       <p:bldP build="whole" bldLvl="1" animBg="1" rev="0" advAuto="0" spid="103" grpId="6"/>
+      <p:bldP build="whole" bldLvl="1" animBg="1" rev="0" advAuto="0" spid="110" grpId="8"/>
+      <p:bldP build="whole" bldLvl="1" animBg="1" rev="0" advAuto="0" spid="116" grpId="10"/>
+      <p:bldP build="whole" bldLvl="1" animBg="1" rev="0" advAuto="0" spid="119" grpId="11"/>
+      <p:bldP build="whole" bldLvl="1" animBg="1" rev="0" advAuto="0" spid="82" grpId="3"/>
+      <p:bldP build="whole" bldLvl="1" animBg="1" rev="0" advAuto="0" spid="143" grpId="13"/>
+      <p:bldP build="whole" bldLvl="1" animBg="1" rev="0" advAuto="0" spid="122" grpId="12"/>
+      <p:bldP build="whole" bldLvl="1" animBg="1" rev="0" advAuto="0" spid="63" grpId="1"/>
+      <p:bldP build="whole" bldLvl="1" animBg="1" rev="0" advAuto="0" spid="75" grpId="2"/>
       <p:bldP build="whole" bldLvl="1" animBg="1" rev="0" advAuto="0" spid="107" grpId="7"/>
-      <p:bldP build="whole" bldLvl="1" animBg="1" rev="0" advAuto="0" spid="116" grpId="10"/>
-      <p:bldP build="whole" bldLvl="1" animBg="1" rev="0" advAuto="0" spid="122" grpId="12"/>
-      <p:bldP build="whole" bldLvl="1" animBg="1" rev="0" advAuto="0" spid="143" grpId="13"/>
-      <p:bldP build="whole" bldLvl="1" animBg="1" rev="0" advAuto="0" spid="119" grpId="11"/>
-      <p:bldP build="whole" bldLvl="1" animBg="1" rev="0" advAuto="0" spid="90" grpId="4"/>
       <p:bldP build="whole" bldLvl="1" animBg="1" rev="0" advAuto="0" spid="113" grpId="9"/>
-      <p:bldP build="whole" bldLvl="1" animBg="1" rev="0" advAuto="0" spid="75" grpId="2"/>
-      <p:bldP build="whole" bldLvl="1" animBg="1" rev="0" advAuto="0" spid="63" grpId="1"/>
-      <p:bldP build="whole" bldLvl="1" animBg="1" rev="0" advAuto="0" spid="110" grpId="8"/>
       <p:bldP build="whole" bldLvl="1" animBg="1" rev="0" advAuto="0" spid="97" grpId="5"/>
-      <p:bldP build="whole" bldLvl="1" animBg="1" rev="0" advAuto="0" spid="82" grpId="3"/>
     </p:bldLst>
   </p:timing>
 </p:sld>
@@ -37615,31 +37615,31 @@
       </p:par>
     </p:tnLst>
     <p:bldLst>
-      <p:bldP build="p" bldLvl="5" animBg="1" rev="0" advAuto="0" spid="232" grpId="5"/>
-      <p:bldP build="whole" bldLvl="1" animBg="1" rev="0" advAuto="0" spid="252" grpId="6"/>
+      <p:bldP build="whole" bldLvl="1" animBg="1" rev="0" advAuto="0" spid="245" grpId="20"/>
       <p:bldP build="whole" bldLvl="1" animBg="1" rev="0" advAuto="0" spid="249" grpId="12"/>
-      <p:bldP build="whole" bldLvl="1" animBg="1" rev="0" advAuto="0" spid="251" grpId="17"/>
-      <p:bldP build="whole" bldLvl="1" animBg="1" rev="0" advAuto="0" spid="268" grpId="1"/>
-      <p:bldP build="whole" bldLvl="1" animBg="1" rev="0" advAuto="0" spid="241" grpId="16"/>
+      <p:bldP build="whole" bldLvl="1" animBg="1" rev="0" advAuto="0" spid="250" grpId="14"/>
       <p:bldP build="whole" bldLvl="1" animBg="1" rev="0" advAuto="0" spid="242" grpId="21"/>
       <p:bldP build="whole" bldLvl="1" animBg="1" rev="0" advAuto="0" spid="242" grpId="25"/>
+      <p:bldP build="whole" bldLvl="1" animBg="1" rev="0" advAuto="0" spid="274" grpId="3"/>
+      <p:bldP build="p" bldLvl="5" animBg="1" rev="0" advAuto="0" spid="232" grpId="5"/>
+      <p:bldP build="whole" bldLvl="1" animBg="1" rev="0" advAuto="0" spid="268" grpId="1"/>
+      <p:bldP build="whole" bldLvl="1" animBg="1" rev="0" advAuto="0" spid="252" grpId="6"/>
+      <p:bldP build="whole" bldLvl="1" animBg="1" rev="0" advAuto="0" spid="277" grpId="4"/>
+      <p:bldP build="whole" bldLvl="1" animBg="1" rev="0" advAuto="0" spid="247" grpId="18"/>
+      <p:bldP build="whole" bldLvl="1" animBg="1" rev="0" advAuto="0" spid="244" grpId="8"/>
+      <p:bldP build="whole" bldLvl="1" animBg="1" rev="0" advAuto="0" spid="274" grpId="9"/>
+      <p:bldP build="whole" bldLvl="1" animBg="1" rev="0" advAuto="0" spid="277" grpId="11"/>
+      <p:bldP build="whole" bldLvl="1" animBg="1" rev="0" advAuto="0" spid="248" grpId="24"/>
+      <p:bldP build="whole" bldLvl="1" animBg="1" rev="0" advAuto="0" spid="257" grpId="22"/>
+      <p:bldP build="whole" bldLvl="1" animBg="1" rev="0" advAuto="0" spid="241" grpId="16"/>
       <p:bldP build="whole" bldLvl="1" animBg="1" rev="0" advAuto="0" spid="246" grpId="15"/>
       <p:bldP build="whole" bldLvl="1" animBg="1" rev="0" advAuto="0" spid="271" grpId="2"/>
+      <p:bldP build="whole" bldLvl="1" animBg="1" rev="0" advAuto="0" spid="251" grpId="13"/>
+      <p:bldP build="whole" bldLvl="1" animBg="1" rev="0" advAuto="0" spid="243" grpId="10"/>
       <p:bldP build="whole" bldLvl="1" animBg="1" rev="0" advAuto="0" spid="246" grpId="19"/>
-      <p:bldP build="whole" bldLvl="1" animBg="1" rev="0" advAuto="0" spid="274" grpId="3"/>
-      <p:bldP build="whole" bldLvl="1" animBg="1" rev="0" advAuto="0" spid="250" grpId="14"/>
+      <p:bldP build="whole" bldLvl="1" animBg="1" rev="0" advAuto="0" spid="251" grpId="17"/>
       <p:bldP build="whole" bldLvl="1" animBg="1" rev="0" advAuto="0" spid="271" grpId="7"/>
-      <p:bldP build="whole" bldLvl="1" animBg="1" rev="0" advAuto="0" spid="277" grpId="4"/>
-      <p:bldP build="whole" bldLvl="1" animBg="1" rev="0" advAuto="0" spid="257" grpId="22"/>
-      <p:bldP build="whole" bldLvl="1" animBg="1" rev="0" advAuto="0" spid="274" grpId="9"/>
       <p:bldP build="whole" bldLvl="1" animBg="1" rev="0" advAuto="0" spid="246" grpId="23"/>
-      <p:bldP build="whole" bldLvl="1" animBg="1" rev="0" advAuto="0" spid="248" grpId="24"/>
-      <p:bldP build="whole" bldLvl="1" animBg="1" rev="0" advAuto="0" spid="277" grpId="11"/>
-      <p:bldP build="whole" bldLvl="1" animBg="1" rev="0" advAuto="0" spid="245" grpId="20"/>
-      <p:bldP build="whole" bldLvl="1" animBg="1" rev="0" advAuto="0" spid="247" grpId="18"/>
-      <p:bldP build="whole" bldLvl="1" animBg="1" rev="0" advAuto="0" spid="244" grpId="8"/>
-      <p:bldP build="whole" bldLvl="1" animBg="1" rev="0" advAuto="0" spid="243" grpId="10"/>
-      <p:bldP build="whole" bldLvl="1" animBg="1" rev="0" advAuto="0" spid="251" grpId="13"/>
     </p:bldLst>
   </p:timing>
 </p:sld>
@@ -40498,17 +40498,17 @@
       </p:par>
     </p:tnLst>
     <p:bldLst>
-      <p:bldP build="whole" bldLvl="1" animBg="1" rev="0" advAuto="0" spid="325" grpId="7"/>
-      <p:bldP build="p" bldLvl="5" animBg="1" rev="0" advAuto="0" spid="283" grpId="11"/>
       <p:bldP build="whole" bldLvl="1" animBg="1" rev="0" advAuto="0" spid="322" grpId="5"/>
+      <p:bldP build="whole" bldLvl="1" animBg="1" rev="0" advAuto="0" spid="319" grpId="1"/>
       <p:bldP build="whole" bldLvl="1" animBg="1" rev="0" advAuto="0" spid="328" grpId="4"/>
       <p:bldP build="whole" bldLvl="1" animBg="1" rev="0" advAuto="0" spid="294" grpId="10"/>
+      <p:bldP build="p" bldLvl="5" animBg="1" rev="0" advAuto="0" spid="283" grpId="11"/>
+      <p:bldP build="whole" bldLvl="1" animBg="1" rev="0" advAuto="0" spid="328" grpId="9"/>
+      <p:bldP build="whole" bldLvl="1" animBg="1" rev="0" advAuto="0" spid="325" grpId="3"/>
+      <p:bldP build="whole" bldLvl="1" animBg="1" rev="0" advAuto="0" spid="298" grpId="8"/>
       <p:bldP build="whole" bldLvl="1" animBg="1" rev="0" advAuto="0" spid="303" grpId="6"/>
-      <p:bldP build="whole" bldLvl="1" animBg="1" rev="0" advAuto="0" spid="298" grpId="8"/>
-      <p:bldP build="whole" bldLvl="1" animBg="1" rev="0" advAuto="0" spid="325" grpId="3"/>
-      <p:bldP build="whole" bldLvl="1" animBg="1" rev="0" advAuto="0" spid="328" grpId="9"/>
-      <p:bldP build="whole" bldLvl="1" animBg="1" rev="0" advAuto="0" spid="319" grpId="1"/>
       <p:bldP build="whole" bldLvl="1" animBg="1" rev="0" advAuto="0" spid="322" grpId="2"/>
+      <p:bldP build="whole" bldLvl="1" animBg="1" rev="0" advAuto="0" spid="325" grpId="7"/>
     </p:bldLst>
   </p:timing>
 </p:sld>

</xml_diff>

<commit_message>
Dyn Prog: Warshall and Floyd Algo
</commit_message>
<xml_diff>
--- a/Slides-RPR/2019-H1-DAA-L32-DynProg-MultiStage-Graphs.pptx
+++ b/Slides-RPR/2019-H1-DAA-L32-DynProg-MultiStage-Graphs.pptx
@@ -2125,7 +2125,7 @@
       </p:grpSpPr>
       <p:sp>
         <p:nvSpPr>
-          <p:cNvPr id="42" name="Design and Analysis of Algorithms   L31: Multi-Stage Graphs…"/>
+          <p:cNvPr id="42" name="Design and Analysis of Algorithms   L32: Multi-Stage Graphs…"/>
           <p:cNvSpPr txBox="1"/>
           <p:nvPr>
             <p:ph type="title"/>
@@ -2201,7 +2201,7 @@
                 <a:cs typeface="Arial"/>
                 <a:sym typeface="Arial"/>
               </a:rPr>
-              <a:t>L31: Multi-Stage Graphs</a:t>
+              <a:t>L32: Multi-Stage Graphs</a:t>
             </a:r>
             <a:endParaRPr>
               <a:latin typeface="Arial"/>
@@ -3740,9 +3740,9 @@
       </p:par>
     </p:tnLst>
     <p:bldLst>
+      <p:bldP build="whole" bldLvl="1" animBg="1" rev="0" advAuto="0" spid="342" grpId="1"/>
       <p:bldP build="whole" bldLvl="1" animBg="1" rev="0" advAuto="0" spid="341" grpId="2"/>
       <p:bldP build="p" bldLvl="5" animBg="1" rev="0" advAuto="0" spid="337" grpId="3"/>
-      <p:bldP build="whole" bldLvl="1" animBg="1" rev="0" advAuto="0" spid="342" grpId="1"/>
     </p:bldLst>
   </p:timing>
 </p:sld>
@@ -13350,8 +13350,8 @@
       </p:par>
     </p:tnLst>
     <p:bldLst>
+      <p:bldP build="p" bldLvl="5" animBg="1" rev="0" advAuto="0" spid="378" grpId="2"/>
       <p:bldP build="p" bldLvl="5" animBg="1" rev="0" advAuto="0" spid="373" grpId="1"/>
-      <p:bldP build="p" bldLvl="5" animBg="1" rev="0" advAuto="0" spid="378" grpId="2"/>
     </p:bldLst>
   </p:timing>
 </p:sld>
@@ -21420,85 +21420,85 @@
       </p:par>
     </p:tnLst>
     <p:bldLst>
+      <p:bldP build="whole" bldLvl="1" animBg="1" rev="0" advAuto="0" spid="426" grpId="37"/>
+      <p:bldP build="whole" bldLvl="1" animBg="1" rev="0" advAuto="0" spid="462" grpId="51"/>
+      <p:bldP build="whole" bldLvl="1" animBg="1" rev="0" advAuto="0" spid="462" grpId="52"/>
+      <p:bldP build="whole" bldLvl="1" animBg="1" rev="0" advAuto="0" spid="426" grpId="38"/>
+      <p:bldP build="whole" bldLvl="1" animBg="1" rev="0" advAuto="0" spid="425" grpId="34"/>
+      <p:bldP build="whole" bldLvl="1" animBg="1" rev="0" advAuto="0" spid="409" grpId="11"/>
+      <p:bldP build="whole" bldLvl="1" animBg="1" rev="0" advAuto="0" spid="446" grpId="35"/>
+      <p:bldP build="whole" bldLvl="1" animBg="1" rev="0" advAuto="0" spid="422" grpId="31"/>
       <p:bldP build="whole" bldLvl="1" animBg="1" rev="0" advAuto="0" spid="387" grpId="4"/>
-      <p:bldP build="whole" bldLvl="1" animBg="1" rev="0" advAuto="0" spid="424" grpId="33"/>
+      <p:bldP build="whole" bldLvl="1" animBg="1" rev="0" advAuto="0" spid="448" grpId="66"/>
+      <p:bldP build="whole" bldLvl="1" animBg="1" rev="0" advAuto="0" spid="388" grpId="6"/>
+      <p:bldP build="whole" bldLvl="1" animBg="1" rev="0" advAuto="0" spid="411" grpId="18"/>
+      <p:bldP build="whole" bldLvl="1" animBg="1" rev="0" advAuto="0" spid="433" grpId="47"/>
+      <p:bldP build="whole" bldLvl="1" animBg="1" rev="0" advAuto="0" spid="391" grpId="12"/>
+      <p:bldP build="whole" bldLvl="1" animBg="1" rev="0" advAuto="0" spid="433" grpId="48"/>
+      <p:bldP build="whole" bldLvl="1" animBg="1" rev="0" advAuto="0" spid="389" grpId="8"/>
+      <p:bldP build="whole" bldLvl="1" animBg="1" rev="0" advAuto="0" spid="393" grpId="14"/>
+      <p:bldP build="whole" bldLvl="1" animBg="1" rev="0" advAuto="0" spid="460" grpId="63"/>
+      <p:bldP build="whole" bldLvl="1" animBg="1" rev="0" advAuto="0" spid="414" grpId="21"/>
+      <p:bldP build="whole" bldLvl="1" animBg="1" rev="0" advAuto="0" spid="460" grpId="64"/>
+      <p:bldP build="whole" bldLvl="1" animBg="1" rev="0" advAuto="0" spid="439" grpId="71"/>
+      <p:bldP build="whole" bldLvl="1" animBg="1" rev="0" advAuto="0" spid="444" grpId="76"/>
+      <p:bldP build="whole" bldLvl="1" animBg="1" rev="0" advAuto="0" spid="445" grpId="77"/>
+      <p:bldP build="whole" bldLvl="1" animBg="1" rev="0" advAuto="0" spid="456" grpId="54"/>
+      <p:bldP build="whole" bldLvl="1" animBg="1" rev="0" advAuto="0" spid="394" grpId="15"/>
+      <p:bldP build="whole" bldLvl="1" animBg="1" rev="0" advAuto="0" spid="417" grpId="24"/>
+      <p:bldP build="whole" bldLvl="1" animBg="1" rev="0" advAuto="0" spid="459" grpId="61"/>
+      <p:bldP build="whole" bldLvl="1" animBg="1" rev="0" advAuto="0" spid="459" grpId="62"/>
+      <p:bldP build="whole" bldLvl="1" animBg="1" rev="0" advAuto="0" spid="421" grpId="30"/>
+      <p:bldP build="whole" bldLvl="1" animBg="1" rev="0" advAuto="0" spid="451" grpId="36"/>
+      <p:bldP build="whole" bldLvl="1" animBg="1" rev="0" advAuto="0" spid="395" grpId="16"/>
       <p:bldP build="whole" bldLvl="1" animBg="1" rev="0" advAuto="0" spid="400" grpId="3"/>
-      <p:bldP build="whole" bldLvl="1" animBg="1" rev="0" advAuto="0" spid="421" grpId="30"/>
-      <p:bldP build="whole" bldLvl="1" animBg="1" rev="0" advAuto="0" spid="461" grpId="65"/>
+      <p:bldP build="whole" bldLvl="1" animBg="1" rev="0" advAuto="0" spid="386" grpId="2"/>
+      <p:bldP build="whole" bldLvl="1" animBg="1" rev="0" advAuto="0" spid="432" grpId="46"/>
+      <p:bldP build="whole" bldLvl="1" animBg="1" rev="0" advAuto="0" spid="453" grpId="45"/>
+      <p:bldP build="whole" bldLvl="1" animBg="1" rev="0" advAuto="0" spid="380" grpId="40"/>
+      <p:bldP build="whole" bldLvl="1" animBg="1" rev="0" advAuto="0" spid="397" grpId="1"/>
+      <p:bldP build="whole" bldLvl="1" animBg="1" rev="0" advAuto="0" spid="415" grpId="22"/>
+      <p:bldP build="whole" bldLvl="1" animBg="1" rev="0" advAuto="0" spid="390" grpId="10"/>
+      <p:bldP build="whole" bldLvl="1" animBg="1" rev="0" advAuto="0" spid="380" grpId="39"/>
+      <p:bldP build="whole" bldLvl="1" animBg="1" rev="0" advAuto="0" spid="436" grpId="68"/>
+      <p:bldP build="whole" bldLvl="1" animBg="1" rev="0" advAuto="0" spid="443" grpId="75"/>
+      <p:bldP build="whole" bldLvl="1" animBg="1" rev="0" advAuto="0" spid="392" grpId="13"/>
+      <p:bldP build="whole" bldLvl="1" animBg="1" rev="0" advAuto="0" spid="412" grpId="19"/>
+      <p:bldP build="whole" bldLvl="1" animBg="1" rev="0" advAuto="0" spid="406" grpId="9"/>
+      <p:bldP build="whole" bldLvl="1" animBg="1" rev="0" advAuto="0" spid="430" grpId="5"/>
+      <p:bldP build="whole" bldLvl="1" animBg="1" rev="0" advAuto="0" spid="455" grpId="53"/>
       <p:bldP build="whole" bldLvl="1" animBg="1" rev="0" advAuto="0" spid="458" grpId="59"/>
       <p:bldP build="whole" bldLvl="1" animBg="1" rev="0" advAuto="0" spid="458" grpId="60"/>
+      <p:bldP build="whole" bldLvl="1" animBg="1" rev="0" advAuto="0" spid="461" grpId="65"/>
+      <p:bldP build="whole" bldLvl="1" animBg="1" rev="0" advAuto="0" spid="437" grpId="69"/>
+      <p:bldP build="whole" bldLvl="1" animBg="1" rev="0" advAuto="0" spid="419" grpId="26"/>
+      <p:bldP build="whole" bldLvl="1" animBg="1" rev="0" advAuto="0" spid="423" grpId="32"/>
+      <p:bldP build="whole" bldLvl="1" animBg="1" rev="0" advAuto="0" spid="410" grpId="17"/>
+      <p:bldP build="whole" bldLvl="1" animBg="1" rev="0" advAuto="0" spid="449" grpId="43"/>
+      <p:bldP build="whole" bldLvl="1" animBg="1" rev="0" advAuto="0" spid="457" grpId="55"/>
+      <p:bldP build="whole" bldLvl="1" animBg="1" rev="0" advAuto="0" spid="440" grpId="72"/>
+      <p:bldP build="whole" bldLvl="1" animBg="1" rev="0" advAuto="0" spid="453" grpId="79"/>
       <p:bldP build="whole" bldLvl="1" animBg="1" rev="0" advAuto="0" spid="435" grpId="57"/>
+      <p:bldP build="whole" bldLvl="1" animBg="1" rev="0" advAuto="0" spid="418" grpId="25"/>
+      <p:bldP build="whole" bldLvl="1" animBg="1" rev="0" advAuto="0" spid="447" grpId="56"/>
+      <p:bldP build="whole" bldLvl="1" animBg="1" rev="0" advAuto="0" spid="435" grpId="58"/>
+      <p:bldP build="whole" bldLvl="1" animBg="1" rev="0" advAuto="0" spid="442" grpId="74"/>
+      <p:bldP build="whole" bldLvl="1" animBg="1" rev="0" advAuto="0" spid="454" grpId="44"/>
+      <p:bldP build="whole" bldLvl="1" animBg="1" rev="0" advAuto="0" spid="441" grpId="73"/>
+      <p:bldP build="whole" bldLvl="1" animBg="1" rev="0" advAuto="0" spid="431" grpId="41"/>
+      <p:bldP build="whole" bldLvl="1" animBg="1" rev="0" advAuto="0" spid="396" grpId="67"/>
+      <p:bldP build="whole" bldLvl="1" animBg="1" rev="0" advAuto="0" spid="413" grpId="20"/>
+      <p:bldP build="whole" bldLvl="1" animBg="1" rev="0" advAuto="0" spid="416" grpId="23"/>
       <p:bldP build="whole" bldLvl="1" animBg="1" rev="0" advAuto="0" spid="452" grpId="27"/>
       <p:bldP build="whole" bldLvl="1" animBg="1" rev="0" advAuto="0" spid="452" grpId="28"/>
-      <p:bldP build="whole" bldLvl="1" animBg="1" rev="0" advAuto="0" spid="454" grpId="44"/>
-      <p:bldP build="whole" bldLvl="1" animBg="1" rev="0" advAuto="0" spid="435" grpId="58"/>
-      <p:bldP build="whole" bldLvl="1" animBg="1" rev="0" advAuto="0" spid="459" grpId="61"/>
-      <p:bldP build="whole" bldLvl="1" animBg="1" rev="0" advAuto="0" spid="459" grpId="62"/>
-      <p:bldP build="whole" bldLvl="1" animBg="1" rev="0" advAuto="0" spid="448" grpId="66"/>
+      <p:bldP build="whole" bldLvl="1" animBg="1" rev="0" advAuto="0" spid="403" grpId="7"/>
       <p:bldP build="whole" bldLvl="1" animBg="1" rev="0" advAuto="0" spid="438" grpId="70"/>
-      <p:bldP build="whole" bldLvl="1" animBg="1" rev="0" advAuto="0" spid="411" grpId="18"/>
-      <p:bldP build="whole" bldLvl="1" animBg="1" rev="0" advAuto="0" spid="406" grpId="9"/>
-      <p:bldP build="whole" bldLvl="1" animBg="1" rev="0" advAuto="0" spid="425" grpId="34"/>
-      <p:bldP build="whole" bldLvl="1" animBg="1" rev="0" advAuto="0" spid="419" grpId="26"/>
-      <p:bldP build="whole" bldLvl="1" animBg="1" rev="0" advAuto="0" spid="451" grpId="36"/>
-      <p:bldP build="whole" bldLvl="1" animBg="1" rev="0" advAuto="0" spid="388" grpId="6"/>
-      <p:bldP build="whole" bldLvl="1" animBg="1" rev="0" advAuto="0" spid="410" grpId="17"/>
-      <p:bldP build="whole" bldLvl="1" animBg="1" rev="0" advAuto="0" spid="453" grpId="79"/>
-      <p:bldP build="whole" bldLvl="1" animBg="1" rev="0" advAuto="0" spid="441" grpId="73"/>
-      <p:bldP build="whole" bldLvl="1" animBg="1" rev="0" advAuto="0" spid="415" grpId="22"/>
-      <p:bldP build="whole" bldLvl="1" animBg="1" rev="0" advAuto="0" spid="436" grpId="68"/>
-      <p:bldP build="whole" bldLvl="1" animBg="1" rev="0" advAuto="0" spid="395" grpId="16"/>
-      <p:bldP build="whole" bldLvl="1" animBg="1" rev="0" advAuto="0" spid="431" grpId="41"/>
-      <p:bldP build="whole" bldLvl="1" animBg="1" rev="0" advAuto="0" spid="380" grpId="39"/>
-      <p:bldP build="whole" bldLvl="1" animBg="1" rev="0" advAuto="0" spid="380" grpId="40"/>
-      <p:bldP build="whole" bldLvl="1" animBg="1" rev="0" advAuto="0" spid="409" grpId="11"/>
-      <p:bldP build="whole" bldLvl="1" animBg="1" rev="0" advAuto="0" spid="439" grpId="71"/>
-      <p:bldP build="whole" bldLvl="1" animBg="1" rev="0" advAuto="0" spid="412" grpId="19"/>
-      <p:bldP build="whole" bldLvl="1" animBg="1" rev="0" advAuto="0" spid="390" grpId="10"/>
-      <p:bldP build="whole" bldLvl="1" animBg="1" rev="0" advAuto="0" spid="462" grpId="51"/>
-      <p:bldP build="whole" bldLvl="1" animBg="1" rev="0" advAuto="0" spid="462" grpId="52"/>
-      <p:bldP build="whole" bldLvl="1" animBg="1" rev="0" advAuto="0" spid="389" grpId="8"/>
-      <p:bldP build="whole" bldLvl="1" animBg="1" rev="0" advAuto="0" spid="440" grpId="72"/>
-      <p:bldP build="whole" bldLvl="1" animBg="1" rev="0" advAuto="0" spid="426" grpId="37"/>
-      <p:bldP build="whole" bldLvl="1" animBg="1" rev="0" advAuto="0" spid="426" grpId="38"/>
-      <p:bldP build="whole" bldLvl="1" animBg="1" rev="0" advAuto="0" spid="460" grpId="63"/>
-      <p:bldP build="whole" bldLvl="1" animBg="1" rev="0" advAuto="0" spid="392" grpId="13"/>
-      <p:bldP build="whole" bldLvl="1" animBg="1" rev="0" advAuto="0" spid="460" grpId="64"/>
-      <p:bldP build="whole" bldLvl="1" animBg="1" rev="0" advAuto="0" spid="394" grpId="15"/>
-      <p:bldP build="whole" bldLvl="1" animBg="1" rev="0" advAuto="0" spid="418" grpId="25"/>
-      <p:bldP build="whole" bldLvl="1" animBg="1" rev="0" advAuto="0" spid="393" grpId="14"/>
-      <p:bldP build="whole" bldLvl="1" animBg="1" rev="0" advAuto="0" spid="437" grpId="69"/>
-      <p:bldP build="whole" bldLvl="1" animBg="1" rev="0" advAuto="0" spid="445" grpId="77"/>
-      <p:bldP build="whole" bldLvl="1" animBg="1" rev="0" advAuto="0" spid="433" grpId="47"/>
-      <p:bldP build="whole" bldLvl="1" animBg="1" rev="0" advAuto="0" spid="433" grpId="48"/>
-      <p:bldP build="whole" bldLvl="1" animBg="1" rev="0" advAuto="0" spid="422" grpId="31"/>
-      <p:bldP build="whole" bldLvl="1" animBg="1" rev="0" advAuto="0" spid="432" grpId="46"/>
-      <p:bldP build="whole" bldLvl="1" animBg="1" rev="0" advAuto="0" spid="397" grpId="1"/>
-      <p:bldP build="whole" bldLvl="1" animBg="1" rev="0" advAuto="0" spid="391" grpId="12"/>
-      <p:bldP build="whole" bldLvl="1" animBg="1" rev="0" advAuto="0" spid="403" grpId="7"/>
-      <p:bldP build="whole" bldLvl="1" animBg="1" rev="0" advAuto="0" spid="442" grpId="74"/>
-      <p:bldP build="whole" bldLvl="1" animBg="1" rev="0" advAuto="0" spid="447" grpId="56"/>
-      <p:bldP build="whole" bldLvl="1" animBg="1" rev="0" advAuto="0" spid="455" grpId="53"/>
-      <p:bldP build="whole" bldLvl="1" animBg="1" rev="0" advAuto="0" spid="446" grpId="35"/>
-      <p:bldP build="whole" bldLvl="1" animBg="1" rev="0" advAuto="0" spid="396" grpId="67"/>
-      <p:bldP build="whole" bldLvl="1" animBg="1" rev="0" advAuto="0" spid="386" grpId="2"/>
-      <p:bldP build="whole" bldLvl="1" animBg="1" rev="0" advAuto="0" spid="443" grpId="75"/>
+      <p:bldP build="whole" bldLvl="1" animBg="1" rev="0" advAuto="0" spid="450" grpId="78"/>
       <p:bldP build="whole" bldLvl="1" animBg="1" rev="0" advAuto="0" spid="427" grpId="42"/>
-      <p:bldP build="whole" bldLvl="1" animBg="1" rev="0" advAuto="0" spid="444" grpId="76"/>
-      <p:bldP build="whole" bldLvl="1" animBg="1" rev="0" advAuto="0" spid="413" grpId="20"/>
-      <p:bldP build="whole" bldLvl="1" animBg="1" rev="0" advAuto="0" spid="430" grpId="5"/>
+      <p:bldP build="whole" bldLvl="1" animBg="1" rev="0" advAuto="0" spid="420" grpId="29"/>
       <p:bldP build="whole" bldLvl="1" animBg="1" rev="0" advAuto="0" spid="434" grpId="49"/>
       <p:bldP build="whole" bldLvl="1" animBg="1" rev="0" advAuto="0" spid="434" grpId="50"/>
-      <p:bldP build="whole" bldLvl="1" animBg="1" rev="0" advAuto="0" spid="456" grpId="54"/>
-      <p:bldP build="whole" bldLvl="1" animBg="1" rev="0" advAuto="0" spid="449" grpId="43"/>
-      <p:bldP build="whole" bldLvl="1" animBg="1" rev="0" advAuto="0" spid="423" grpId="32"/>
-      <p:bldP build="whole" bldLvl="1" animBg="1" rev="0" advAuto="0" spid="420" grpId="29"/>
-      <p:bldP build="whole" bldLvl="1" animBg="1" rev="0" advAuto="0" spid="457" grpId="55"/>
-      <p:bldP build="whole" bldLvl="1" animBg="1" rev="0" advAuto="0" spid="450" grpId="78"/>
-      <p:bldP build="whole" bldLvl="1" animBg="1" rev="0" advAuto="0" spid="453" grpId="45"/>
-      <p:bldP build="whole" bldLvl="1" animBg="1" rev="0" advAuto="0" spid="417" grpId="24"/>
-      <p:bldP build="whole" bldLvl="1" animBg="1" rev="0" advAuto="0" spid="414" grpId="21"/>
-      <p:bldP build="whole" bldLvl="1" animBg="1" rev="0" advAuto="0" spid="416" grpId="23"/>
+      <p:bldP build="whole" bldLvl="1" animBg="1" rev="0" advAuto="0" spid="424" grpId="33"/>
     </p:bldLst>
   </p:timing>
 </p:sld>
@@ -23788,7 +23788,52 @@
         </p:nvSpPr>
         <p:spPr>
           <a:xfrm>
-            <a:off x="928638" y="3419750"/>
+            <a:off x="895381" y="4417459"/>
+            <a:ext cx="580049" cy="616813"/>
+          </a:xfrm>
+          <a:prstGeom prst="ellipse">
+            <a:avLst/>
+          </a:prstGeom>
+          <a:ln w="25400">
+            <a:solidFill>
+              <a:srgbClr val="000000"/>
+            </a:solidFill>
+          </a:ln>
+          <a:extLst>
+            <a:ext uri="{C572A759-6A51-4108-AA02-DFA0A04FC94B}">
+              <ma14:wrappingTextBoxFlag xmlns:ma14="http://schemas.microsoft.com/office/mac/drawingml/2011/main" val="1"/>
+            </a:ext>
+          </a:extLst>
+        </p:spPr>
+        <p:txBody>
+          <a:bodyPr lIns="50800" tIns="50800" rIns="50800" bIns="50800" anchor="ctr"/>
+          <a:lstStyle>
+            <a:lvl1pPr algn="ctr">
+              <a:defRPr sz="2600">
+                <a:latin typeface="Arial"/>
+                <a:ea typeface="Arial"/>
+                <a:cs typeface="Arial"/>
+                <a:sym typeface="Arial"/>
+              </a:defRPr>
+            </a:lvl1pPr>
+          </a:lstStyle>
+          <a:p>
+            <a:pPr/>
+            <a:r>
+              <a:t>1</a:t>
+            </a:r>
+          </a:p>
+        </p:txBody>
+      </p:sp>
+      <p:sp>
+        <p:nvSpPr>
+          <p:cNvPr id="481" name="2"/>
+          <p:cNvSpPr/>
+          <p:nvPr/>
+        </p:nvSpPr>
+        <p:spPr>
+          <a:xfrm>
+            <a:off x="2708670" y="3361823"/>
             <a:ext cx="580049" cy="616814"/>
           </a:xfrm>
           <a:prstGeom prst="ellipse">
@@ -23820,20 +23865,200 @@
           <a:p>
             <a:pPr/>
             <a:r>
-              <a:t>1</a:t>
+              <a:t>2</a:t>
             </a:r>
           </a:p>
         </p:txBody>
       </p:sp>
       <p:sp>
         <p:nvSpPr>
-          <p:cNvPr id="481" name="2"/>
+          <p:cNvPr id="482" name="3"/>
           <p:cNvSpPr/>
           <p:nvPr/>
         </p:nvSpPr>
         <p:spPr>
           <a:xfrm>
-            <a:off x="2741927" y="2364114"/>
+            <a:off x="2708670" y="5342626"/>
+            <a:ext cx="580049" cy="616813"/>
+          </a:xfrm>
+          <a:prstGeom prst="ellipse">
+            <a:avLst/>
+          </a:prstGeom>
+          <a:ln w="25400">
+            <a:solidFill>
+              <a:srgbClr val="000000"/>
+            </a:solidFill>
+          </a:ln>
+          <a:extLst>
+            <a:ext uri="{C572A759-6A51-4108-AA02-DFA0A04FC94B}">
+              <ma14:wrappingTextBoxFlag xmlns:ma14="http://schemas.microsoft.com/office/mac/drawingml/2011/main" val="1"/>
+            </a:ext>
+          </a:extLst>
+        </p:spPr>
+        <p:txBody>
+          <a:bodyPr lIns="50800" tIns="50800" rIns="50800" bIns="50800" anchor="ctr"/>
+          <a:lstStyle>
+            <a:lvl1pPr algn="ctr">
+              <a:defRPr sz="2600">
+                <a:latin typeface="Arial"/>
+                <a:ea typeface="Arial"/>
+                <a:cs typeface="Arial"/>
+                <a:sym typeface="Arial"/>
+              </a:defRPr>
+            </a:lvl1pPr>
+          </a:lstStyle>
+          <a:p>
+            <a:pPr/>
+            <a:r>
+              <a:t>3</a:t>
+            </a:r>
+          </a:p>
+        </p:txBody>
+      </p:sp>
+      <p:sp>
+        <p:nvSpPr>
+          <p:cNvPr id="483" name="4"/>
+          <p:cNvSpPr/>
+          <p:nvPr/>
+        </p:nvSpPr>
+        <p:spPr>
+          <a:xfrm>
+            <a:off x="4547618" y="2449271"/>
+            <a:ext cx="580049" cy="616813"/>
+          </a:xfrm>
+          <a:prstGeom prst="ellipse">
+            <a:avLst/>
+          </a:prstGeom>
+          <a:ln w="25400">
+            <a:solidFill>
+              <a:srgbClr val="000000"/>
+            </a:solidFill>
+          </a:ln>
+          <a:extLst>
+            <a:ext uri="{C572A759-6A51-4108-AA02-DFA0A04FC94B}">
+              <ma14:wrappingTextBoxFlag xmlns:ma14="http://schemas.microsoft.com/office/mac/drawingml/2011/main" val="1"/>
+            </a:ext>
+          </a:extLst>
+        </p:spPr>
+        <p:txBody>
+          <a:bodyPr lIns="50800" tIns="50800" rIns="50800" bIns="50800" anchor="ctr"/>
+          <a:lstStyle>
+            <a:lvl1pPr algn="ctr">
+              <a:defRPr sz="2600">
+                <a:latin typeface="Arial"/>
+                <a:ea typeface="Arial"/>
+                <a:cs typeface="Arial"/>
+                <a:sym typeface="Arial"/>
+              </a:defRPr>
+            </a:lvl1pPr>
+          </a:lstStyle>
+          <a:p>
+            <a:pPr/>
+            <a:r>
+              <a:t>4</a:t>
+            </a:r>
+          </a:p>
+        </p:txBody>
+      </p:sp>
+      <p:sp>
+        <p:nvSpPr>
+          <p:cNvPr id="484" name="5"/>
+          <p:cNvSpPr/>
+          <p:nvPr/>
+        </p:nvSpPr>
+        <p:spPr>
+          <a:xfrm>
+            <a:off x="4547618" y="4417459"/>
+            <a:ext cx="580049" cy="616813"/>
+          </a:xfrm>
+          <a:prstGeom prst="ellipse">
+            <a:avLst/>
+          </a:prstGeom>
+          <a:ln w="25400">
+            <a:solidFill>
+              <a:srgbClr val="000000"/>
+            </a:solidFill>
+          </a:ln>
+          <a:extLst>
+            <a:ext uri="{C572A759-6A51-4108-AA02-DFA0A04FC94B}">
+              <ma14:wrappingTextBoxFlag xmlns:ma14="http://schemas.microsoft.com/office/mac/drawingml/2011/main" val="1"/>
+            </a:ext>
+          </a:extLst>
+        </p:spPr>
+        <p:txBody>
+          <a:bodyPr lIns="50800" tIns="50800" rIns="50800" bIns="50800" anchor="ctr"/>
+          <a:lstStyle>
+            <a:lvl1pPr algn="ctr">
+              <a:defRPr sz="2600">
+                <a:latin typeface="Arial"/>
+                <a:ea typeface="Arial"/>
+                <a:cs typeface="Arial"/>
+                <a:sym typeface="Arial"/>
+              </a:defRPr>
+            </a:lvl1pPr>
+          </a:lstStyle>
+          <a:p>
+            <a:pPr/>
+            <a:r>
+              <a:t>5</a:t>
+            </a:r>
+          </a:p>
+        </p:txBody>
+      </p:sp>
+      <p:sp>
+        <p:nvSpPr>
+          <p:cNvPr id="485" name="6"/>
+          <p:cNvSpPr/>
+          <p:nvPr/>
+        </p:nvSpPr>
+        <p:spPr>
+          <a:xfrm>
+            <a:off x="4547618" y="6195876"/>
+            <a:ext cx="580049" cy="616813"/>
+          </a:xfrm>
+          <a:prstGeom prst="ellipse">
+            <a:avLst/>
+          </a:prstGeom>
+          <a:ln w="25400">
+            <a:solidFill>
+              <a:srgbClr val="000000"/>
+            </a:solidFill>
+          </a:ln>
+          <a:extLst>
+            <a:ext uri="{C572A759-6A51-4108-AA02-DFA0A04FC94B}">
+              <ma14:wrappingTextBoxFlag xmlns:ma14="http://schemas.microsoft.com/office/mac/drawingml/2011/main" val="1"/>
+            </a:ext>
+          </a:extLst>
+        </p:spPr>
+        <p:txBody>
+          <a:bodyPr lIns="50800" tIns="50800" rIns="50800" bIns="50800" anchor="ctr"/>
+          <a:lstStyle>
+            <a:lvl1pPr algn="ctr">
+              <a:defRPr sz="2600">
+                <a:latin typeface="Arial"/>
+                <a:ea typeface="Arial"/>
+                <a:cs typeface="Arial"/>
+                <a:sym typeface="Arial"/>
+              </a:defRPr>
+            </a:lvl1pPr>
+          </a:lstStyle>
+          <a:p>
+            <a:pPr/>
+            <a:r>
+              <a:t>6</a:t>
+            </a:r>
+          </a:p>
+        </p:txBody>
+      </p:sp>
+      <p:sp>
+        <p:nvSpPr>
+          <p:cNvPr id="486" name="7"/>
+          <p:cNvSpPr/>
+          <p:nvPr/>
+        </p:nvSpPr>
+        <p:spPr>
+          <a:xfrm>
+            <a:off x="6825719" y="3361823"/>
             <a:ext cx="580049" cy="616814"/>
           </a:xfrm>
           <a:prstGeom prst="ellipse">
@@ -23865,21 +24090,21 @@
           <a:p>
             <a:pPr/>
             <a:r>
-              <a:t>2</a:t>
+              <a:t>7</a:t>
             </a:r>
           </a:p>
         </p:txBody>
       </p:sp>
       <p:sp>
         <p:nvSpPr>
-          <p:cNvPr id="482" name="3"/>
+          <p:cNvPr id="487" name="8"/>
           <p:cNvSpPr/>
           <p:nvPr/>
         </p:nvSpPr>
         <p:spPr>
           <a:xfrm>
-            <a:off x="2741927" y="4344917"/>
-            <a:ext cx="580049" cy="616814"/>
+            <a:off x="6825719" y="5342626"/>
+            <a:ext cx="580049" cy="616813"/>
           </a:xfrm>
           <a:prstGeom prst="ellipse">
             <a:avLst/>
@@ -23910,21 +24135,21 @@
           <a:p>
             <a:pPr/>
             <a:r>
-              <a:t>3</a:t>
+              <a:t>8</a:t>
             </a:r>
           </a:p>
         </p:txBody>
       </p:sp>
       <p:sp>
         <p:nvSpPr>
-          <p:cNvPr id="483" name="4"/>
+          <p:cNvPr id="488" name="9"/>
           <p:cNvSpPr/>
           <p:nvPr/>
         </p:nvSpPr>
         <p:spPr>
           <a:xfrm>
-            <a:off x="4580875" y="1451562"/>
-            <a:ext cx="580049" cy="616814"/>
+            <a:off x="8787880" y="4417459"/>
+            <a:ext cx="580049" cy="616813"/>
           </a:xfrm>
           <a:prstGeom prst="ellipse">
             <a:avLst/>
@@ -23955,231 +24180,6 @@
           <a:p>
             <a:pPr/>
             <a:r>
-              <a:t>4</a:t>
-            </a:r>
-          </a:p>
-        </p:txBody>
-      </p:sp>
-      <p:sp>
-        <p:nvSpPr>
-          <p:cNvPr id="484" name="5"/>
-          <p:cNvSpPr/>
-          <p:nvPr/>
-        </p:nvSpPr>
-        <p:spPr>
-          <a:xfrm>
-            <a:off x="4580875" y="3419750"/>
-            <a:ext cx="580049" cy="616814"/>
-          </a:xfrm>
-          <a:prstGeom prst="ellipse">
-            <a:avLst/>
-          </a:prstGeom>
-          <a:ln w="25400">
-            <a:solidFill>
-              <a:srgbClr val="000000"/>
-            </a:solidFill>
-          </a:ln>
-          <a:extLst>
-            <a:ext uri="{C572A759-6A51-4108-AA02-DFA0A04FC94B}">
-              <ma14:wrappingTextBoxFlag xmlns:ma14="http://schemas.microsoft.com/office/mac/drawingml/2011/main" val="1"/>
-            </a:ext>
-          </a:extLst>
-        </p:spPr>
-        <p:txBody>
-          <a:bodyPr lIns="50800" tIns="50800" rIns="50800" bIns="50800" anchor="ctr"/>
-          <a:lstStyle>
-            <a:lvl1pPr algn="ctr">
-              <a:defRPr sz="2600">
-                <a:latin typeface="Arial"/>
-                <a:ea typeface="Arial"/>
-                <a:cs typeface="Arial"/>
-                <a:sym typeface="Arial"/>
-              </a:defRPr>
-            </a:lvl1pPr>
-          </a:lstStyle>
-          <a:p>
-            <a:pPr/>
-            <a:r>
-              <a:t>5</a:t>
-            </a:r>
-          </a:p>
-        </p:txBody>
-      </p:sp>
-      <p:sp>
-        <p:nvSpPr>
-          <p:cNvPr id="485" name="6"/>
-          <p:cNvSpPr/>
-          <p:nvPr/>
-        </p:nvSpPr>
-        <p:spPr>
-          <a:xfrm>
-            <a:off x="4580875" y="5198167"/>
-            <a:ext cx="580049" cy="616814"/>
-          </a:xfrm>
-          <a:prstGeom prst="ellipse">
-            <a:avLst/>
-          </a:prstGeom>
-          <a:ln w="25400">
-            <a:solidFill>
-              <a:srgbClr val="000000"/>
-            </a:solidFill>
-          </a:ln>
-          <a:extLst>
-            <a:ext uri="{C572A759-6A51-4108-AA02-DFA0A04FC94B}">
-              <ma14:wrappingTextBoxFlag xmlns:ma14="http://schemas.microsoft.com/office/mac/drawingml/2011/main" val="1"/>
-            </a:ext>
-          </a:extLst>
-        </p:spPr>
-        <p:txBody>
-          <a:bodyPr lIns="50800" tIns="50800" rIns="50800" bIns="50800" anchor="ctr"/>
-          <a:lstStyle>
-            <a:lvl1pPr algn="ctr">
-              <a:defRPr sz="2600">
-                <a:latin typeface="Arial"/>
-                <a:ea typeface="Arial"/>
-                <a:cs typeface="Arial"/>
-                <a:sym typeface="Arial"/>
-              </a:defRPr>
-            </a:lvl1pPr>
-          </a:lstStyle>
-          <a:p>
-            <a:pPr/>
-            <a:r>
-              <a:t>6</a:t>
-            </a:r>
-          </a:p>
-        </p:txBody>
-      </p:sp>
-      <p:sp>
-        <p:nvSpPr>
-          <p:cNvPr id="486" name="7"/>
-          <p:cNvSpPr/>
-          <p:nvPr/>
-        </p:nvSpPr>
-        <p:spPr>
-          <a:xfrm>
-            <a:off x="6858976" y="2364114"/>
-            <a:ext cx="580049" cy="616814"/>
-          </a:xfrm>
-          <a:prstGeom prst="ellipse">
-            <a:avLst/>
-          </a:prstGeom>
-          <a:ln w="25400">
-            <a:solidFill>
-              <a:srgbClr val="000000"/>
-            </a:solidFill>
-          </a:ln>
-          <a:extLst>
-            <a:ext uri="{C572A759-6A51-4108-AA02-DFA0A04FC94B}">
-              <ma14:wrappingTextBoxFlag xmlns:ma14="http://schemas.microsoft.com/office/mac/drawingml/2011/main" val="1"/>
-            </a:ext>
-          </a:extLst>
-        </p:spPr>
-        <p:txBody>
-          <a:bodyPr lIns="50800" tIns="50800" rIns="50800" bIns="50800" anchor="ctr"/>
-          <a:lstStyle>
-            <a:lvl1pPr algn="ctr">
-              <a:defRPr sz="2600">
-                <a:latin typeface="Arial"/>
-                <a:ea typeface="Arial"/>
-                <a:cs typeface="Arial"/>
-                <a:sym typeface="Arial"/>
-              </a:defRPr>
-            </a:lvl1pPr>
-          </a:lstStyle>
-          <a:p>
-            <a:pPr/>
-            <a:r>
-              <a:t>7</a:t>
-            </a:r>
-          </a:p>
-        </p:txBody>
-      </p:sp>
-      <p:sp>
-        <p:nvSpPr>
-          <p:cNvPr id="487" name="8"/>
-          <p:cNvSpPr/>
-          <p:nvPr/>
-        </p:nvSpPr>
-        <p:spPr>
-          <a:xfrm>
-            <a:off x="6858976" y="4344917"/>
-            <a:ext cx="580049" cy="616814"/>
-          </a:xfrm>
-          <a:prstGeom prst="ellipse">
-            <a:avLst/>
-          </a:prstGeom>
-          <a:ln w="25400">
-            <a:solidFill>
-              <a:srgbClr val="000000"/>
-            </a:solidFill>
-          </a:ln>
-          <a:extLst>
-            <a:ext uri="{C572A759-6A51-4108-AA02-DFA0A04FC94B}">
-              <ma14:wrappingTextBoxFlag xmlns:ma14="http://schemas.microsoft.com/office/mac/drawingml/2011/main" val="1"/>
-            </a:ext>
-          </a:extLst>
-        </p:spPr>
-        <p:txBody>
-          <a:bodyPr lIns="50800" tIns="50800" rIns="50800" bIns="50800" anchor="ctr"/>
-          <a:lstStyle>
-            <a:lvl1pPr algn="ctr">
-              <a:defRPr sz="2600">
-                <a:latin typeface="Arial"/>
-                <a:ea typeface="Arial"/>
-                <a:cs typeface="Arial"/>
-                <a:sym typeface="Arial"/>
-              </a:defRPr>
-            </a:lvl1pPr>
-          </a:lstStyle>
-          <a:p>
-            <a:pPr/>
-            <a:r>
-              <a:t>8</a:t>
-            </a:r>
-          </a:p>
-        </p:txBody>
-      </p:sp>
-      <p:sp>
-        <p:nvSpPr>
-          <p:cNvPr id="488" name="9"/>
-          <p:cNvSpPr/>
-          <p:nvPr/>
-        </p:nvSpPr>
-        <p:spPr>
-          <a:xfrm>
-            <a:off x="8821137" y="3419750"/>
-            <a:ext cx="580049" cy="616814"/>
-          </a:xfrm>
-          <a:prstGeom prst="ellipse">
-            <a:avLst/>
-          </a:prstGeom>
-          <a:ln w="25400">
-            <a:solidFill>
-              <a:srgbClr val="000000"/>
-            </a:solidFill>
-          </a:ln>
-          <a:extLst>
-            <a:ext uri="{C572A759-6A51-4108-AA02-DFA0A04FC94B}">
-              <ma14:wrappingTextBoxFlag xmlns:ma14="http://schemas.microsoft.com/office/mac/drawingml/2011/main" val="1"/>
-            </a:ext>
-          </a:extLst>
-        </p:spPr>
-        <p:txBody>
-          <a:bodyPr lIns="50800" tIns="50800" rIns="50800" bIns="50800" anchor="ctr"/>
-          <a:lstStyle>
-            <a:lvl1pPr algn="ctr">
-              <a:defRPr sz="2600">
-                <a:latin typeface="Arial"/>
-                <a:ea typeface="Arial"/>
-                <a:cs typeface="Arial"/>
-                <a:sym typeface="Arial"/>
-              </a:defRPr>
-            </a:lvl1pPr>
-          </a:lstStyle>
-          <a:p>
-            <a:pPr/>
-            <a:r>
               <a:t>9</a:t>
             </a:r>
           </a:p>
@@ -24193,8 +24193,8 @@
         </p:nvSpPr>
         <p:spPr>
           <a:xfrm flipV="1">
-            <a:off x="1494006" y="2866553"/>
-            <a:ext cx="1271080" cy="780281"/>
+            <a:off x="1460749" y="3864262"/>
+            <a:ext cx="1271080" cy="780280"/>
           </a:xfrm>
           <a:prstGeom prst="line">
             <a:avLst/>
@@ -24222,8 +24222,8 @@
         </p:nvSpPr>
         <p:spPr>
           <a:xfrm flipV="1">
-            <a:off x="3300482" y="1811680"/>
-            <a:ext cx="1271081" cy="780281"/>
+            <a:off x="3267225" y="2809389"/>
+            <a:ext cx="1271081" cy="780280"/>
           </a:xfrm>
           <a:prstGeom prst="line">
             <a:avLst/>
@@ -24251,8 +24251,8 @@
         </p:nvSpPr>
         <p:spPr>
           <a:xfrm flipV="1">
-            <a:off x="3300482" y="3824977"/>
-            <a:ext cx="1271081" cy="780281"/>
+            <a:off x="3267225" y="4822686"/>
+            <a:ext cx="1271081" cy="780280"/>
           </a:xfrm>
           <a:prstGeom prst="line">
             <a:avLst/>
@@ -24280,8 +24280,8 @@
         </p:nvSpPr>
         <p:spPr>
           <a:xfrm flipV="1">
-            <a:off x="5173343" y="4841679"/>
-            <a:ext cx="1635802" cy="611631"/>
+            <a:off x="5140086" y="5839387"/>
+            <a:ext cx="1635803" cy="611632"/>
           </a:xfrm>
           <a:prstGeom prst="line">
             <a:avLst/>
@@ -24309,8 +24309,8 @@
         </p:nvSpPr>
         <p:spPr>
           <a:xfrm flipV="1">
-            <a:off x="7457602" y="3824977"/>
-            <a:ext cx="1271080" cy="780281"/>
+            <a:off x="7424345" y="4822686"/>
+            <a:ext cx="1271080" cy="780280"/>
           </a:xfrm>
           <a:prstGeom prst="line">
             <a:avLst/>
@@ -24338,7 +24338,7 @@
         </p:nvSpPr>
         <p:spPr>
           <a:xfrm flipV="1">
-            <a:off x="5173343" y="2874122"/>
+            <a:off x="5140086" y="3871831"/>
             <a:ext cx="1636845" cy="772711"/>
           </a:xfrm>
           <a:prstGeom prst="line">
@@ -24367,7 +24367,7 @@
         </p:nvSpPr>
         <p:spPr>
           <a:xfrm>
-            <a:off x="1494006" y="3873604"/>
+            <a:off x="1460749" y="4871312"/>
             <a:ext cx="1271828" cy="715014"/>
           </a:xfrm>
           <a:prstGeom prst="line">
@@ -24396,8 +24396,8 @@
         </p:nvSpPr>
         <p:spPr>
           <a:xfrm>
-            <a:off x="3167454" y="2915607"/>
-            <a:ext cx="1543351" cy="2393345"/>
+            <a:off x="3134197" y="3913315"/>
+            <a:ext cx="1543351" cy="2393346"/>
           </a:xfrm>
           <a:prstGeom prst="line">
             <a:avLst/>
@@ -24425,8 +24425,8 @@
         </p:nvSpPr>
         <p:spPr>
           <a:xfrm flipV="1">
-            <a:off x="3161426" y="2148533"/>
-            <a:ext cx="1554980" cy="2221845"/>
+            <a:off x="3128170" y="3146242"/>
+            <a:ext cx="1554979" cy="2221845"/>
           </a:xfrm>
           <a:prstGeom prst="line">
             <a:avLst/>
@@ -24454,7 +24454,7 @@
         </p:nvSpPr>
         <p:spPr>
           <a:xfrm>
-            <a:off x="3296348" y="4797312"/>
+            <a:off x="3263091" y="5795020"/>
             <a:ext cx="1271828" cy="715014"/>
           </a:xfrm>
           <a:prstGeom prst="line">
@@ -24483,7 +24483,7 @@
         </p:nvSpPr>
         <p:spPr>
           <a:xfrm>
-            <a:off x="5172654" y="1828286"/>
+            <a:off x="5139397" y="2825995"/>
             <a:ext cx="1638861" cy="778590"/>
           </a:xfrm>
           <a:prstGeom prst="line">
@@ -24512,8 +24512,8 @@
         </p:nvSpPr>
         <p:spPr>
           <a:xfrm>
-            <a:off x="5114909" y="1988543"/>
-            <a:ext cx="1761465" cy="2392758"/>
+            <a:off x="5081652" y="2986251"/>
+            <a:ext cx="1761465" cy="2392759"/>
           </a:xfrm>
           <a:prstGeom prst="line">
             <a:avLst/>
@@ -24541,8 +24541,8 @@
         </p:nvSpPr>
         <p:spPr>
           <a:xfrm>
-            <a:off x="5099811" y="3939905"/>
-            <a:ext cx="1783578" cy="611393"/>
+            <a:off x="5066555" y="4937614"/>
+            <a:ext cx="1783577" cy="611393"/>
           </a:xfrm>
           <a:prstGeom prst="line">
             <a:avLst/>
@@ -24570,8 +24570,8 @@
         </p:nvSpPr>
         <p:spPr>
           <a:xfrm flipV="1">
-            <a:off x="5122341" y="3079847"/>
-            <a:ext cx="1928467" cy="2274670"/>
+            <a:off x="5089085" y="4077556"/>
+            <a:ext cx="1928466" cy="2274670"/>
           </a:xfrm>
           <a:prstGeom prst="line">
             <a:avLst/>
@@ -24599,8 +24599,8 @@
         </p:nvSpPr>
         <p:spPr>
           <a:xfrm>
-            <a:off x="7413714" y="2830071"/>
-            <a:ext cx="1358173" cy="715043"/>
+            <a:off x="7380458" y="3827779"/>
+            <a:ext cx="1358172" cy="715043"/>
           </a:xfrm>
           <a:prstGeom prst="line">
             <a:avLst/>
@@ -24628,8 +24628,8 @@
         </p:nvSpPr>
         <p:spPr>
           <a:xfrm>
-            <a:off x="307052" y="3998085"/>
-            <a:ext cx="1069788" cy="447229"/>
+            <a:off x="273795" y="4995793"/>
+            <a:ext cx="1069788" cy="447230"/>
           </a:xfrm>
           <a:prstGeom prst="rect">
             <a:avLst/>
@@ -24673,7 +24673,52 @@
         </p:nvSpPr>
         <p:spPr>
           <a:xfrm>
-            <a:off x="1707781" y="2955660"/>
+            <a:off x="1674524" y="3953369"/>
+            <a:ext cx="324456" cy="447229"/>
+          </a:xfrm>
+          <a:prstGeom prst="rect">
+            <a:avLst/>
+          </a:prstGeom>
+          <a:ln w="12700">
+            <a:miter lim="400000"/>
+          </a:ln>
+          <a:extLst>
+            <a:ext uri="{C572A759-6A51-4108-AA02-DFA0A04FC94B}">
+              <ma14:wrappingTextBoxFlag xmlns:ma14="http://schemas.microsoft.com/office/mac/drawingml/2011/main" val="1"/>
+            </a:ext>
+          </a:extLst>
+        </p:spPr>
+        <p:txBody>
+          <a:bodyPr wrap="none" lIns="50800" tIns="50800" rIns="50800" bIns="50800" anchor="ctr">
+            <a:spAutoFit/>
+          </a:bodyPr>
+          <a:lstStyle>
+            <a:lvl1pPr>
+              <a:defRPr sz="2400">
+                <a:latin typeface="Arial"/>
+                <a:ea typeface="Arial"/>
+                <a:cs typeface="Arial"/>
+                <a:sym typeface="Arial"/>
+              </a:defRPr>
+            </a:lvl1pPr>
+          </a:lstStyle>
+          <a:p>
+            <a:pPr/>
+            <a:r>
+              <a:t>5</a:t>
+            </a:r>
+          </a:p>
+        </p:txBody>
+      </p:sp>
+      <p:sp>
+        <p:nvSpPr>
+          <p:cNvPr id="506" name="2"/>
+          <p:cNvSpPr txBox="1"/>
+          <p:nvPr/>
+        </p:nvSpPr>
+        <p:spPr>
+          <a:xfrm>
+            <a:off x="1674524" y="5086650"/>
             <a:ext cx="324456" cy="447230"/>
           </a:xfrm>
           <a:prstGeom prst="rect">
@@ -24705,20 +24750,110 @@
           <a:p>
             <a:pPr/>
             <a:r>
-              <a:t>5</a:t>
+              <a:t>2</a:t>
             </a:r>
           </a:p>
         </p:txBody>
       </p:sp>
       <p:sp>
         <p:nvSpPr>
-          <p:cNvPr id="506" name="2"/>
+          <p:cNvPr id="507" name="3"/>
           <p:cNvSpPr txBox="1"/>
           <p:nvPr/>
         </p:nvSpPr>
         <p:spPr>
           <a:xfrm>
-            <a:off x="1707781" y="4088942"/>
+            <a:off x="3464086" y="2814701"/>
+            <a:ext cx="324457" cy="447229"/>
+          </a:xfrm>
+          <a:prstGeom prst="rect">
+            <a:avLst/>
+          </a:prstGeom>
+          <a:ln w="12700">
+            <a:miter lim="400000"/>
+          </a:ln>
+          <a:extLst>
+            <a:ext uri="{C572A759-6A51-4108-AA02-DFA0A04FC94B}">
+              <ma14:wrappingTextBoxFlag xmlns:ma14="http://schemas.microsoft.com/office/mac/drawingml/2011/main" val="1"/>
+            </a:ext>
+          </a:extLst>
+        </p:spPr>
+        <p:txBody>
+          <a:bodyPr wrap="none" lIns="50800" tIns="50800" rIns="50800" bIns="50800" anchor="ctr">
+            <a:spAutoFit/>
+          </a:bodyPr>
+          <a:lstStyle>
+            <a:lvl1pPr>
+              <a:defRPr sz="2400">
+                <a:latin typeface="Arial"/>
+                <a:ea typeface="Arial"/>
+                <a:cs typeface="Arial"/>
+                <a:sym typeface="Arial"/>
+              </a:defRPr>
+            </a:lvl1pPr>
+          </a:lstStyle>
+          <a:p>
+            <a:pPr/>
+            <a:r>
+              <a:t>3</a:t>
+            </a:r>
+          </a:p>
+        </p:txBody>
+      </p:sp>
+      <p:sp>
+        <p:nvSpPr>
+          <p:cNvPr id="508" name="3"/>
+          <p:cNvSpPr txBox="1"/>
+          <p:nvPr/>
+        </p:nvSpPr>
+        <p:spPr>
+          <a:xfrm>
+            <a:off x="3281517" y="3818693"/>
+            <a:ext cx="324456" cy="447230"/>
+          </a:xfrm>
+          <a:prstGeom prst="rect">
+            <a:avLst/>
+          </a:prstGeom>
+          <a:ln w="12700">
+            <a:miter lim="400000"/>
+          </a:ln>
+          <a:extLst>
+            <a:ext uri="{C572A759-6A51-4108-AA02-DFA0A04FC94B}">
+              <ma14:wrappingTextBoxFlag xmlns:ma14="http://schemas.microsoft.com/office/mac/drawingml/2011/main" val="1"/>
+            </a:ext>
+          </a:extLst>
+        </p:spPr>
+        <p:txBody>
+          <a:bodyPr wrap="none" lIns="50800" tIns="50800" rIns="50800" bIns="50800" anchor="ctr">
+            <a:spAutoFit/>
+          </a:bodyPr>
+          <a:lstStyle>
+            <a:lvl1pPr>
+              <a:defRPr sz="2400">
+                <a:latin typeface="Arial"/>
+                <a:ea typeface="Arial"/>
+                <a:cs typeface="Arial"/>
+                <a:sym typeface="Arial"/>
+              </a:defRPr>
+            </a:lvl1pPr>
+          </a:lstStyle>
+          <a:p>
+            <a:pPr/>
+            <a:r>
+              <a:t>3</a:t>
+            </a:r>
+          </a:p>
+        </p:txBody>
+      </p:sp>
+      <p:sp>
+        <p:nvSpPr>
+          <p:cNvPr id="509" name="6"/>
+          <p:cNvSpPr txBox="1"/>
+          <p:nvPr/>
+        </p:nvSpPr>
+        <p:spPr>
+          <a:xfrm>
+            <a:off x="2974771" y="4822686"/>
             <a:ext cx="324456" cy="447229"/>
           </a:xfrm>
           <a:prstGeom prst="rect">
@@ -24750,21 +24885,21 @@
           <a:p>
             <a:pPr/>
             <a:r>
-              <a:t>2</a:t>
+              <a:t>6</a:t>
             </a:r>
           </a:p>
         </p:txBody>
       </p:sp>
       <p:sp>
         <p:nvSpPr>
-          <p:cNvPr id="507" name="3"/>
+          <p:cNvPr id="510" name="5"/>
           <p:cNvSpPr txBox="1"/>
           <p:nvPr/>
         </p:nvSpPr>
         <p:spPr>
           <a:xfrm>
-            <a:off x="3497343" y="1816992"/>
-            <a:ext cx="324457" cy="447230"/>
+            <a:off x="3370417" y="4997329"/>
+            <a:ext cx="324456" cy="447229"/>
           </a:xfrm>
           <a:prstGeom prst="rect">
             <a:avLst/>
@@ -24795,20 +24930,20 @@
           <a:p>
             <a:pPr/>
             <a:r>
-              <a:t>3</a:t>
+              <a:t>5</a:t>
             </a:r>
           </a:p>
         </p:txBody>
       </p:sp>
       <p:sp>
         <p:nvSpPr>
-          <p:cNvPr id="508" name="3"/>
+          <p:cNvPr id="511" name="8"/>
           <p:cNvSpPr txBox="1"/>
           <p:nvPr/>
         </p:nvSpPr>
         <p:spPr>
           <a:xfrm>
-            <a:off x="3314774" y="2820984"/>
+            <a:off x="3281517" y="5890143"/>
             <a:ext cx="324456" cy="447230"/>
           </a:xfrm>
           <a:prstGeom prst="rect">
@@ -24840,20 +24975,20 @@
           <a:p>
             <a:pPr/>
             <a:r>
-              <a:t>3</a:t>
+              <a:t>8</a:t>
             </a:r>
           </a:p>
         </p:txBody>
       </p:sp>
       <p:sp>
         <p:nvSpPr>
-          <p:cNvPr id="509" name="6"/>
+          <p:cNvPr id="512" name="1"/>
           <p:cNvSpPr txBox="1"/>
           <p:nvPr/>
         </p:nvSpPr>
         <p:spPr>
           <a:xfrm>
-            <a:off x="3008028" y="3824977"/>
+            <a:off x="5366046" y="2534063"/>
             <a:ext cx="324456" cy="447229"/>
           </a:xfrm>
           <a:prstGeom prst="rect">
@@ -24885,20 +25020,65 @@
           <a:p>
             <a:pPr/>
             <a:r>
-              <a:t>6</a:t>
+              <a:t>1</a:t>
             </a:r>
           </a:p>
         </p:txBody>
       </p:sp>
       <p:sp>
         <p:nvSpPr>
-          <p:cNvPr id="510" name="5"/>
+          <p:cNvPr id="513" name="4"/>
           <p:cNvSpPr txBox="1"/>
           <p:nvPr/>
         </p:nvSpPr>
         <p:spPr>
           <a:xfrm>
-            <a:off x="3403674" y="3999620"/>
+            <a:off x="5513435" y="3241449"/>
+            <a:ext cx="324456" cy="447229"/>
+          </a:xfrm>
+          <a:prstGeom prst="rect">
+            <a:avLst/>
+          </a:prstGeom>
+          <a:ln w="12700">
+            <a:miter lim="400000"/>
+          </a:ln>
+          <a:extLst>
+            <a:ext uri="{C572A759-6A51-4108-AA02-DFA0A04FC94B}">
+              <ma14:wrappingTextBoxFlag xmlns:ma14="http://schemas.microsoft.com/office/mac/drawingml/2011/main" val="1"/>
+            </a:ext>
+          </a:extLst>
+        </p:spPr>
+        <p:txBody>
+          <a:bodyPr wrap="none" lIns="50800" tIns="50800" rIns="50800" bIns="50800" anchor="ctr">
+            <a:spAutoFit/>
+          </a:bodyPr>
+          <a:lstStyle>
+            <a:lvl1pPr>
+              <a:defRPr sz="2400">
+                <a:latin typeface="Arial"/>
+                <a:ea typeface="Arial"/>
+                <a:cs typeface="Arial"/>
+                <a:sym typeface="Arial"/>
+              </a:defRPr>
+            </a:lvl1pPr>
+          </a:lstStyle>
+          <a:p>
+            <a:pPr/>
+            <a:r>
+              <a:t>4</a:t>
+            </a:r>
+          </a:p>
+        </p:txBody>
+      </p:sp>
+      <p:sp>
+        <p:nvSpPr>
+          <p:cNvPr id="514" name="6"/>
+          <p:cNvSpPr txBox="1"/>
+          <p:nvPr/>
+        </p:nvSpPr>
+        <p:spPr>
+          <a:xfrm>
+            <a:off x="5162377" y="4175302"/>
             <a:ext cx="324456" cy="447230"/>
           </a:xfrm>
           <a:prstGeom prst="rect">
@@ -24930,20 +25110,20 @@
           <a:p>
             <a:pPr/>
             <a:r>
-              <a:t>5</a:t>
+              <a:t>6</a:t>
             </a:r>
           </a:p>
         </p:txBody>
       </p:sp>
       <p:sp>
         <p:nvSpPr>
-          <p:cNvPr id="511" name="8"/>
+          <p:cNvPr id="515" name="2"/>
           <p:cNvSpPr txBox="1"/>
           <p:nvPr/>
         </p:nvSpPr>
         <p:spPr>
           <a:xfrm>
-            <a:off x="3314774" y="4892435"/>
+            <a:off x="5258075" y="4634894"/>
             <a:ext cx="324456" cy="447229"/>
           </a:xfrm>
           <a:prstGeom prst="rect">
@@ -24975,20 +25155,110 @@
           <a:p>
             <a:pPr/>
             <a:r>
-              <a:t>8</a:t>
+              <a:t>2</a:t>
             </a:r>
           </a:p>
         </p:txBody>
       </p:sp>
       <p:sp>
         <p:nvSpPr>
-          <p:cNvPr id="512" name="1"/>
+          <p:cNvPr id="516" name="6"/>
           <p:cNvSpPr txBox="1"/>
           <p:nvPr/>
         </p:nvSpPr>
         <p:spPr>
           <a:xfrm>
-            <a:off x="5399303" y="1536354"/>
+            <a:off x="5127836" y="5654942"/>
+            <a:ext cx="324456" cy="447230"/>
+          </a:xfrm>
+          <a:prstGeom prst="rect">
+            <a:avLst/>
+          </a:prstGeom>
+          <a:ln w="12700">
+            <a:miter lim="400000"/>
+          </a:ln>
+          <a:extLst>
+            <a:ext uri="{C572A759-6A51-4108-AA02-DFA0A04FC94B}">
+              <ma14:wrappingTextBoxFlag xmlns:ma14="http://schemas.microsoft.com/office/mac/drawingml/2011/main" val="1"/>
+            </a:ext>
+          </a:extLst>
+        </p:spPr>
+        <p:txBody>
+          <a:bodyPr wrap="none" lIns="50800" tIns="50800" rIns="50800" bIns="50800" anchor="ctr">
+            <a:spAutoFit/>
+          </a:bodyPr>
+          <a:lstStyle>
+            <a:lvl1pPr>
+              <a:defRPr sz="2400">
+                <a:latin typeface="Arial"/>
+                <a:ea typeface="Arial"/>
+                <a:cs typeface="Arial"/>
+                <a:sym typeface="Arial"/>
+              </a:defRPr>
+            </a:lvl1pPr>
+          </a:lstStyle>
+          <a:p>
+            <a:pPr/>
+            <a:r>
+              <a:t>6</a:t>
+            </a:r>
+          </a:p>
+        </p:txBody>
+      </p:sp>
+      <p:sp>
+        <p:nvSpPr>
+          <p:cNvPr id="517" name="2"/>
+          <p:cNvSpPr txBox="1"/>
+          <p:nvPr/>
+        </p:nvSpPr>
+        <p:spPr>
+          <a:xfrm>
+            <a:off x="5583056" y="5824594"/>
+            <a:ext cx="324456" cy="447230"/>
+          </a:xfrm>
+          <a:prstGeom prst="rect">
+            <a:avLst/>
+          </a:prstGeom>
+          <a:ln w="12700">
+            <a:miter lim="400000"/>
+          </a:ln>
+          <a:extLst>
+            <a:ext uri="{C572A759-6A51-4108-AA02-DFA0A04FC94B}">
+              <ma14:wrappingTextBoxFlag xmlns:ma14="http://schemas.microsoft.com/office/mac/drawingml/2011/main" val="1"/>
+            </a:ext>
+          </a:extLst>
+        </p:spPr>
+        <p:txBody>
+          <a:bodyPr wrap="none" lIns="50800" tIns="50800" rIns="50800" bIns="50800" anchor="ctr">
+            <a:spAutoFit/>
+          </a:bodyPr>
+          <a:lstStyle>
+            <a:lvl1pPr>
+              <a:defRPr sz="2400">
+                <a:latin typeface="Arial"/>
+                <a:ea typeface="Arial"/>
+                <a:cs typeface="Arial"/>
+                <a:sym typeface="Arial"/>
+              </a:defRPr>
+            </a:lvl1pPr>
+          </a:lstStyle>
+          <a:p>
+            <a:pPr/>
+            <a:r>
+              <a:t>2</a:t>
+            </a:r>
+          </a:p>
+        </p:txBody>
+      </p:sp>
+      <p:sp>
+        <p:nvSpPr>
+          <p:cNvPr id="518" name="7"/>
+          <p:cNvSpPr txBox="1"/>
+          <p:nvPr/>
+        </p:nvSpPr>
+        <p:spPr>
+          <a:xfrm>
+            <a:off x="7692530" y="3647786"/>
             <a:ext cx="324456" cy="447229"/>
           </a:xfrm>
           <a:prstGeom prst="rect">
@@ -25020,20 +25290,20 @@
           <a:p>
             <a:pPr/>
             <a:r>
-              <a:t>1</a:t>
+              <a:t>7</a:t>
             </a:r>
           </a:p>
         </p:txBody>
       </p:sp>
       <p:sp>
         <p:nvSpPr>
-          <p:cNvPr id="513" name="4"/>
+          <p:cNvPr id="519" name="3"/>
           <p:cNvSpPr txBox="1"/>
           <p:nvPr/>
         </p:nvSpPr>
         <p:spPr>
           <a:xfrm>
-            <a:off x="5546692" y="2243740"/>
+            <a:off x="7480418" y="4995793"/>
             <a:ext cx="324456" cy="447230"/>
           </a:xfrm>
           <a:prstGeom prst="rect">
@@ -25065,21 +25335,21 @@
           <a:p>
             <a:pPr/>
             <a:r>
-              <a:t>4</a:t>
+              <a:t>3</a:t>
             </a:r>
           </a:p>
         </p:txBody>
       </p:sp>
       <p:sp>
         <p:nvSpPr>
-          <p:cNvPr id="514" name="6"/>
+          <p:cNvPr id="520" name="sink"/>
           <p:cNvSpPr txBox="1"/>
           <p:nvPr/>
         </p:nvSpPr>
         <p:spPr>
           <a:xfrm>
-            <a:off x="5195634" y="3177594"/>
-            <a:ext cx="324456" cy="447229"/>
+            <a:off x="8775180" y="4995793"/>
+            <a:ext cx="696973" cy="447230"/>
           </a:xfrm>
           <a:prstGeom prst="rect">
             <a:avLst/>
@@ -25110,21 +25380,21 @@
           <a:p>
             <a:pPr/>
             <a:r>
-              <a:t>6</a:t>
+              <a:t>sink</a:t>
             </a:r>
           </a:p>
         </p:txBody>
       </p:sp>
       <p:sp>
         <p:nvSpPr>
-          <p:cNvPr id="515" name="2"/>
+          <p:cNvPr id="521" name="Using forward approach…"/>
           <p:cNvSpPr txBox="1"/>
           <p:nvPr/>
         </p:nvSpPr>
         <p:spPr>
           <a:xfrm>
-            <a:off x="5291332" y="3637185"/>
-            <a:ext cx="324456" cy="447230"/>
+            <a:off x="442846" y="964053"/>
+            <a:ext cx="4715075" cy="1059181"/>
           </a:xfrm>
           <a:prstGeom prst="rect">
             <a:avLst/>
@@ -25142,245 +25412,47 @@
           <a:bodyPr wrap="none" lIns="50800" tIns="50800" rIns="50800" bIns="50800" anchor="ctr">
             <a:spAutoFit/>
           </a:bodyPr>
-          <a:lstStyle>
-            <a:lvl1pPr>
-              <a:defRPr sz="2400">
-                <a:latin typeface="Arial"/>
-                <a:ea typeface="Arial"/>
-                <a:cs typeface="Arial"/>
-                <a:sym typeface="Arial"/>
+          <a:lstStyle/>
+          <a:p>
+            <a:pPr marL="382587" indent="-342900">
+              <a:lnSpc>
+                <a:spcPct val="90000"/>
+              </a:lnSpc>
+              <a:spcBef>
+                <a:spcPts val="700"/>
+              </a:spcBef>
+              <a:buSzPct val="100000"/>
+              <a:buChar char="•"/>
+              <a:defRPr sz="3200">
+                <a:latin typeface="+mn-lt"/>
+                <a:ea typeface="+mn-ea"/>
+                <a:cs typeface="+mn-cs"/>
+                <a:sym typeface="Gill Sans"/>
               </a:defRPr>
-            </a:lvl1pPr>
-          </a:lstStyle>
-          <a:p>
-            <a:pPr/>
-            <a:r>
-              <a:t>2</a:t>
-            </a:r>
-          </a:p>
-        </p:txBody>
-      </p:sp>
-      <p:sp>
-        <p:nvSpPr>
-          <p:cNvPr id="516" name="6"/>
-          <p:cNvSpPr txBox="1"/>
-          <p:nvPr/>
-        </p:nvSpPr>
-        <p:spPr>
-          <a:xfrm>
-            <a:off x="5161093" y="4657233"/>
-            <a:ext cx="324456" cy="447230"/>
-          </a:xfrm>
-          <a:prstGeom prst="rect">
-            <a:avLst/>
-          </a:prstGeom>
-          <a:ln w="12700">
-            <a:miter lim="400000"/>
-          </a:ln>
-          <a:extLst>
-            <a:ext uri="{C572A759-6A51-4108-AA02-DFA0A04FC94B}">
-              <ma14:wrappingTextBoxFlag xmlns:ma14="http://schemas.microsoft.com/office/mac/drawingml/2011/main" val="1"/>
-            </a:ext>
-          </a:extLst>
-        </p:spPr>
-        <p:txBody>
-          <a:bodyPr wrap="none" lIns="50800" tIns="50800" rIns="50800" bIns="50800" anchor="ctr">
-            <a:spAutoFit/>
-          </a:bodyPr>
-          <a:lstStyle>
-            <a:lvl1pPr>
-              <a:defRPr sz="2400">
-                <a:latin typeface="Arial"/>
-                <a:ea typeface="Arial"/>
-                <a:cs typeface="Arial"/>
-                <a:sym typeface="Arial"/>
+            </a:pPr>
+            <a:r>
+              <a:t>Using forward approach</a:t>
+            </a:r>
+          </a:p>
+          <a:p>
+            <a:pPr marL="382587" indent="-342900">
+              <a:lnSpc>
+                <a:spcPct val="90000"/>
+              </a:lnSpc>
+              <a:spcBef>
+                <a:spcPts val="700"/>
+              </a:spcBef>
+              <a:buSzPct val="100000"/>
+              <a:buChar char="•"/>
+              <a:defRPr sz="3200">
+                <a:latin typeface="+mn-lt"/>
+                <a:ea typeface="+mn-ea"/>
+                <a:cs typeface="+mn-cs"/>
+                <a:sym typeface="Gill Sans"/>
               </a:defRPr>
-            </a:lvl1pPr>
-          </a:lstStyle>
-          <a:p>
-            <a:pPr/>
-            <a:r>
-              <a:t>6</a:t>
-            </a:r>
-          </a:p>
-        </p:txBody>
-      </p:sp>
-      <p:sp>
-        <p:nvSpPr>
-          <p:cNvPr id="517" name="2"/>
-          <p:cNvSpPr txBox="1"/>
-          <p:nvPr/>
-        </p:nvSpPr>
-        <p:spPr>
-          <a:xfrm>
-            <a:off x="5616313" y="4826885"/>
-            <a:ext cx="324456" cy="447230"/>
-          </a:xfrm>
-          <a:prstGeom prst="rect">
-            <a:avLst/>
-          </a:prstGeom>
-          <a:ln w="12700">
-            <a:miter lim="400000"/>
-          </a:ln>
-          <a:extLst>
-            <a:ext uri="{C572A759-6A51-4108-AA02-DFA0A04FC94B}">
-              <ma14:wrappingTextBoxFlag xmlns:ma14="http://schemas.microsoft.com/office/mac/drawingml/2011/main" val="1"/>
-            </a:ext>
-          </a:extLst>
-        </p:spPr>
-        <p:txBody>
-          <a:bodyPr wrap="none" lIns="50800" tIns="50800" rIns="50800" bIns="50800" anchor="ctr">
-            <a:spAutoFit/>
-          </a:bodyPr>
-          <a:lstStyle>
-            <a:lvl1pPr>
-              <a:defRPr sz="2400">
-                <a:latin typeface="Arial"/>
-                <a:ea typeface="Arial"/>
-                <a:cs typeface="Arial"/>
-                <a:sym typeface="Arial"/>
-              </a:defRPr>
-            </a:lvl1pPr>
-          </a:lstStyle>
-          <a:p>
-            <a:pPr/>
-            <a:r>
-              <a:t>2</a:t>
-            </a:r>
-          </a:p>
-        </p:txBody>
-      </p:sp>
-      <p:sp>
-        <p:nvSpPr>
-          <p:cNvPr id="518" name="7"/>
-          <p:cNvSpPr txBox="1"/>
-          <p:nvPr/>
-        </p:nvSpPr>
-        <p:spPr>
-          <a:xfrm>
-            <a:off x="7725787" y="2650077"/>
-            <a:ext cx="324456" cy="447230"/>
-          </a:xfrm>
-          <a:prstGeom prst="rect">
-            <a:avLst/>
-          </a:prstGeom>
-          <a:ln w="12700">
-            <a:miter lim="400000"/>
-          </a:ln>
-          <a:extLst>
-            <a:ext uri="{C572A759-6A51-4108-AA02-DFA0A04FC94B}">
-              <ma14:wrappingTextBoxFlag xmlns:ma14="http://schemas.microsoft.com/office/mac/drawingml/2011/main" val="1"/>
-            </a:ext>
-          </a:extLst>
-        </p:spPr>
-        <p:txBody>
-          <a:bodyPr wrap="none" lIns="50800" tIns="50800" rIns="50800" bIns="50800" anchor="ctr">
-            <a:spAutoFit/>
-          </a:bodyPr>
-          <a:lstStyle>
-            <a:lvl1pPr>
-              <a:defRPr sz="2400">
-                <a:latin typeface="Arial"/>
-                <a:ea typeface="Arial"/>
-                <a:cs typeface="Arial"/>
-                <a:sym typeface="Arial"/>
-              </a:defRPr>
-            </a:lvl1pPr>
-          </a:lstStyle>
-          <a:p>
-            <a:pPr/>
-            <a:r>
-              <a:t>7</a:t>
-            </a:r>
-          </a:p>
-        </p:txBody>
-      </p:sp>
-      <p:sp>
-        <p:nvSpPr>
-          <p:cNvPr id="519" name="3"/>
-          <p:cNvSpPr txBox="1"/>
-          <p:nvPr/>
-        </p:nvSpPr>
-        <p:spPr>
-          <a:xfrm>
-            <a:off x="7513675" y="3998085"/>
-            <a:ext cx="324456" cy="447229"/>
-          </a:xfrm>
-          <a:prstGeom prst="rect">
-            <a:avLst/>
-          </a:prstGeom>
-          <a:ln w="12700">
-            <a:miter lim="400000"/>
-          </a:ln>
-          <a:extLst>
-            <a:ext uri="{C572A759-6A51-4108-AA02-DFA0A04FC94B}">
-              <ma14:wrappingTextBoxFlag xmlns:ma14="http://schemas.microsoft.com/office/mac/drawingml/2011/main" val="1"/>
-            </a:ext>
-          </a:extLst>
-        </p:spPr>
-        <p:txBody>
-          <a:bodyPr wrap="none" lIns="50800" tIns="50800" rIns="50800" bIns="50800" anchor="ctr">
-            <a:spAutoFit/>
-          </a:bodyPr>
-          <a:lstStyle>
-            <a:lvl1pPr>
-              <a:defRPr sz="2400">
-                <a:latin typeface="Arial"/>
-                <a:ea typeface="Arial"/>
-                <a:cs typeface="Arial"/>
-                <a:sym typeface="Arial"/>
-              </a:defRPr>
-            </a:lvl1pPr>
-          </a:lstStyle>
-          <a:p>
-            <a:pPr/>
-            <a:r>
-              <a:t>3</a:t>
-            </a:r>
-          </a:p>
-        </p:txBody>
-      </p:sp>
-      <p:sp>
-        <p:nvSpPr>
-          <p:cNvPr id="520" name="sink"/>
-          <p:cNvSpPr txBox="1"/>
-          <p:nvPr/>
-        </p:nvSpPr>
-        <p:spPr>
-          <a:xfrm>
-            <a:off x="8808437" y="3998085"/>
-            <a:ext cx="696973" cy="447229"/>
-          </a:xfrm>
-          <a:prstGeom prst="rect">
-            <a:avLst/>
-          </a:prstGeom>
-          <a:ln w="12700">
-            <a:miter lim="400000"/>
-          </a:ln>
-          <a:extLst>
-            <a:ext uri="{C572A759-6A51-4108-AA02-DFA0A04FC94B}">
-              <ma14:wrappingTextBoxFlag xmlns:ma14="http://schemas.microsoft.com/office/mac/drawingml/2011/main" val="1"/>
-            </a:ext>
-          </a:extLst>
-        </p:spPr>
-        <p:txBody>
-          <a:bodyPr wrap="none" lIns="50800" tIns="50800" rIns="50800" bIns="50800" anchor="ctr">
-            <a:spAutoFit/>
-          </a:bodyPr>
-          <a:lstStyle>
-            <a:lvl1pPr>
-              <a:defRPr sz="2400">
-                <a:latin typeface="Arial"/>
-                <a:ea typeface="Arial"/>
-                <a:cs typeface="Arial"/>
-                <a:sym typeface="Arial"/>
-              </a:defRPr>
-            </a:lvl1pPr>
-          </a:lstStyle>
-          <a:p>
-            <a:pPr/>
-            <a:r>
-              <a:t>sink</a:t>
+            </a:pPr>
+            <a:r>
+              <a:t>Using backward approach</a:t>
             </a:r>
           </a:p>
         </p:txBody>
@@ -25752,7 +25824,7 @@
       </p:grpSpPr>
       <p:sp>
         <p:nvSpPr>
-          <p:cNvPr id="522" name="Summary"/>
+          <p:cNvPr id="523" name="Summary"/>
           <p:cNvSpPr txBox="1"/>
           <p:nvPr>
             <p:ph type="title"/>
@@ -25776,7 +25848,7 @@
       </p:sp>
       <p:sp>
         <p:nvSpPr>
-          <p:cNvPr id="523" name="Multi stage graph…"/>
+          <p:cNvPr id="524" name="Multi stage graph…"/>
           <p:cNvSpPr txBox="1"/>
           <p:nvPr>
             <p:ph type="body" idx="1"/>
@@ -25812,7 +25884,7 @@
       </p:sp>
       <p:sp>
         <p:nvSpPr>
-          <p:cNvPr id="524" name="Slide Number"/>
+          <p:cNvPr id="525" name="Slide Number"/>
           <p:cNvSpPr txBox="1"/>
           <p:nvPr>
             <p:ph type="sldNum" sz="quarter" idx="2"/>
@@ -25839,7 +25911,7 @@
       </p:sp>
       <p:sp>
         <p:nvSpPr>
-          <p:cNvPr id="525" name="DAA/Dynamic Programming"/>
+          <p:cNvPr id="526" name="DAA/Dynamic Programming"/>
           <p:cNvSpPr txBox="1"/>
           <p:nvPr/>
         </p:nvSpPr>
@@ -25879,7 +25951,7 @@
       </p:sp>
       <p:sp>
         <p:nvSpPr>
-          <p:cNvPr id="526" name="RPR/"/>
+          <p:cNvPr id="527" name="RPR/"/>
           <p:cNvSpPr txBox="1"/>
           <p:nvPr/>
         </p:nvSpPr>
@@ -25956,7 +26028,7 @@
                                       <p:cBhvr>
                                         <p:cTn id="6" fill="hold"/>
                                         <p:tgtEl>
-                                          <p:spTgt spid="523">
+                                          <p:spTgt spid="524">
                                             <p:bg/>
                                           </p:spTgt>
                                         </p:tgtEl>
@@ -25984,7 +26056,7 @@
                                       <p:cBhvr>
                                         <p:cTn id="8" fill="hold"/>
                                         <p:tgtEl>
-                                          <p:spTgt spid="523">
+                                          <p:spTgt spid="524">
                                             <p:txEl>
                                               <p:pRg st="0" end="0"/>
                                             </p:txEl>
@@ -26032,7 +26104,7 @@
                                       <p:cBhvr>
                                         <p:cTn id="12" fill="hold"/>
                                         <p:tgtEl>
-                                          <p:spTgt spid="523">
+                                          <p:spTgt spid="524">
                                             <p:txEl>
                                               <p:pRg st="1" end="1"/>
                                             </p:txEl>
@@ -26080,7 +26152,7 @@
                                       <p:cBhvr>
                                         <p:cTn id="16" fill="hold"/>
                                         <p:tgtEl>
-                                          <p:spTgt spid="523">
+                                          <p:spTgt spid="524">
                                             <p:txEl>
                                               <p:pRg st="2" end="2"/>
                                             </p:txEl>
@@ -26125,7 +26197,7 @@
       </p:par>
     </p:tnLst>
     <p:bldLst>
-      <p:bldP build="p" bldLvl="5" animBg="1" rev="0" advAuto="0" spid="523" grpId="1"/>
+      <p:bldP build="p" bldLvl="5" animBg="1" rev="0" advAuto="0" spid="524" grpId="1"/>
     </p:bldLst>
   </p:timing>
 </p:sld>
@@ -30727,19 +30799,19 @@
       </p:par>
     </p:tnLst>
     <p:bldLst>
-      <p:bldP build="whole" bldLvl="1" animBg="1" rev="0" advAuto="0" spid="90" grpId="4"/>
-      <p:bldP build="whole" bldLvl="1" animBg="1" rev="0" advAuto="0" spid="103" grpId="6"/>
+      <p:bldP build="whole" bldLvl="1" animBg="1" rev="0" advAuto="0" spid="82" grpId="3"/>
+      <p:bldP build="whole" bldLvl="1" animBg="1" rev="0" advAuto="0" spid="119" grpId="11"/>
+      <p:bldP build="whole" bldLvl="1" animBg="1" rev="0" advAuto="0" spid="63" grpId="1"/>
       <p:bldP build="whole" bldLvl="1" animBg="1" rev="0" advAuto="0" spid="110" grpId="8"/>
-      <p:bldP build="whole" bldLvl="1" animBg="1" rev="0" advAuto="0" spid="116" grpId="10"/>
-      <p:bldP build="whole" bldLvl="1" animBg="1" rev="0" advAuto="0" spid="119" grpId="11"/>
-      <p:bldP build="whole" bldLvl="1" animBg="1" rev="0" advAuto="0" spid="82" grpId="3"/>
-      <p:bldP build="whole" bldLvl="1" animBg="1" rev="0" advAuto="0" spid="143" grpId="13"/>
-      <p:bldP build="whole" bldLvl="1" animBg="1" rev="0" advAuto="0" spid="122" grpId="12"/>
-      <p:bldP build="whole" bldLvl="1" animBg="1" rev="0" advAuto="0" spid="63" grpId="1"/>
       <p:bldP build="whole" bldLvl="1" animBg="1" rev="0" advAuto="0" spid="75" grpId="2"/>
       <p:bldP build="whole" bldLvl="1" animBg="1" rev="0" advAuto="0" spid="107" grpId="7"/>
+      <p:bldP build="whole" bldLvl="1" animBg="1" rev="0" advAuto="0" spid="90" grpId="4"/>
+      <p:bldP build="whole" bldLvl="1" animBg="1" rev="0" advAuto="0" spid="122" grpId="12"/>
+      <p:bldP build="whole" bldLvl="1" animBg="1" rev="0" advAuto="0" spid="143" grpId="13"/>
+      <p:bldP build="whole" bldLvl="1" animBg="1" rev="0" advAuto="0" spid="116" grpId="10"/>
       <p:bldP build="whole" bldLvl="1" animBg="1" rev="0" advAuto="0" spid="113" grpId="9"/>
       <p:bldP build="whole" bldLvl="1" animBg="1" rev="0" advAuto="0" spid="97" grpId="5"/>
+      <p:bldP build="whole" bldLvl="1" animBg="1" rev="0" advAuto="0" spid="103" grpId="6"/>
     </p:bldLst>
   </p:timing>
 </p:sld>
@@ -32381,8 +32453,8 @@
       </p:par>
     </p:tnLst>
     <p:bldLst>
+      <p:bldP build="p" bldLvl="5" animBg="1" rev="0" advAuto="0" spid="146" grpId="1"/>
       <p:bldP build="whole" bldLvl="1" animBg="1" rev="0" advAuto="0" spid="179" grpId="2"/>
-      <p:bldP build="p" bldLvl="5" animBg="1" rev="0" advAuto="0" spid="146" grpId="1"/>
     </p:bldLst>
   </p:timing>
 </p:sld>
@@ -37615,31 +37687,31 @@
       </p:par>
     </p:tnLst>
     <p:bldLst>
+      <p:bldP build="whole" bldLvl="1" animBg="1" rev="0" advAuto="0" spid="246" grpId="23"/>
+      <p:bldP build="p" bldLvl="5" animBg="1" rev="0" advAuto="0" spid="232" grpId="5"/>
+      <p:bldP build="whole" bldLvl="1" animBg="1" rev="0" advAuto="0" spid="243" grpId="10"/>
+      <p:bldP build="whole" bldLvl="1" animBg="1" rev="0" advAuto="0" spid="274" grpId="3"/>
+      <p:bldP build="whole" bldLvl="1" animBg="1" rev="0" advAuto="0" spid="277" grpId="11"/>
+      <p:bldP build="whole" bldLvl="1" animBg="1" rev="0" advAuto="0" spid="251" grpId="17"/>
+      <p:bldP build="whole" bldLvl="1" animBg="1" rev="0" advAuto="0" spid="251" grpId="13"/>
+      <p:bldP build="whole" bldLvl="1" animBg="1" rev="0" advAuto="0" spid="274" grpId="9"/>
+      <p:bldP build="whole" bldLvl="1" animBg="1" rev="0" advAuto="0" spid="257" grpId="22"/>
+      <p:bldP build="whole" bldLvl="1" animBg="1" rev="0" advAuto="0" spid="268" grpId="1"/>
+      <p:bldP build="whole" bldLvl="1" animBg="1" rev="0" advAuto="0" spid="242" grpId="21"/>
+      <p:bldP build="whole" bldLvl="1" animBg="1" rev="0" advAuto="0" spid="249" grpId="12"/>
+      <p:bldP build="whole" bldLvl="1" animBg="1" rev="0" advAuto="0" spid="242" grpId="25"/>
       <p:bldP build="whole" bldLvl="1" animBg="1" rev="0" advAuto="0" spid="245" grpId="20"/>
-      <p:bldP build="whole" bldLvl="1" animBg="1" rev="0" advAuto="0" spid="249" grpId="12"/>
+      <p:bldP build="whole" bldLvl="1" animBg="1" rev="0" advAuto="0" spid="248" grpId="24"/>
+      <p:bldP build="whole" bldLvl="1" animBg="1" rev="0" advAuto="0" spid="271" grpId="2"/>
+      <p:bldP build="whole" bldLvl="1" animBg="1" rev="0" advAuto="0" spid="247" grpId="18"/>
+      <p:bldP build="whole" bldLvl="1" animBg="1" rev="0" advAuto="0" spid="246" grpId="15"/>
+      <p:bldP build="whole" bldLvl="1" animBg="1" rev="0" advAuto="0" spid="244" grpId="8"/>
+      <p:bldP build="whole" bldLvl="1" animBg="1" rev="0" advAuto="0" spid="241" grpId="16"/>
+      <p:bldP build="whole" bldLvl="1" animBg="1" rev="0" advAuto="0" spid="271" grpId="7"/>
+      <p:bldP build="whole" bldLvl="1" animBg="1" rev="0" advAuto="0" spid="246" grpId="19"/>
       <p:bldP build="whole" bldLvl="1" animBg="1" rev="0" advAuto="0" spid="250" grpId="14"/>
-      <p:bldP build="whole" bldLvl="1" animBg="1" rev="0" advAuto="0" spid="242" grpId="21"/>
-      <p:bldP build="whole" bldLvl="1" animBg="1" rev="0" advAuto="0" spid="242" grpId="25"/>
-      <p:bldP build="whole" bldLvl="1" animBg="1" rev="0" advAuto="0" spid="274" grpId="3"/>
-      <p:bldP build="p" bldLvl="5" animBg="1" rev="0" advAuto="0" spid="232" grpId="5"/>
-      <p:bldP build="whole" bldLvl="1" animBg="1" rev="0" advAuto="0" spid="268" grpId="1"/>
+      <p:bldP build="whole" bldLvl="1" animBg="1" rev="0" advAuto="0" spid="277" grpId="4"/>
       <p:bldP build="whole" bldLvl="1" animBg="1" rev="0" advAuto="0" spid="252" grpId="6"/>
-      <p:bldP build="whole" bldLvl="1" animBg="1" rev="0" advAuto="0" spid="277" grpId="4"/>
-      <p:bldP build="whole" bldLvl="1" animBg="1" rev="0" advAuto="0" spid="247" grpId="18"/>
-      <p:bldP build="whole" bldLvl="1" animBg="1" rev="0" advAuto="0" spid="244" grpId="8"/>
-      <p:bldP build="whole" bldLvl="1" animBg="1" rev="0" advAuto="0" spid="274" grpId="9"/>
-      <p:bldP build="whole" bldLvl="1" animBg="1" rev="0" advAuto="0" spid="277" grpId="11"/>
-      <p:bldP build="whole" bldLvl="1" animBg="1" rev="0" advAuto="0" spid="248" grpId="24"/>
-      <p:bldP build="whole" bldLvl="1" animBg="1" rev="0" advAuto="0" spid="257" grpId="22"/>
-      <p:bldP build="whole" bldLvl="1" animBg="1" rev="0" advAuto="0" spid="241" grpId="16"/>
-      <p:bldP build="whole" bldLvl="1" animBg="1" rev="0" advAuto="0" spid="246" grpId="15"/>
-      <p:bldP build="whole" bldLvl="1" animBg="1" rev="0" advAuto="0" spid="271" grpId="2"/>
-      <p:bldP build="whole" bldLvl="1" animBg="1" rev="0" advAuto="0" spid="251" grpId="13"/>
-      <p:bldP build="whole" bldLvl="1" animBg="1" rev="0" advAuto="0" spid="243" grpId="10"/>
-      <p:bldP build="whole" bldLvl="1" animBg="1" rev="0" advAuto="0" spid="246" grpId="19"/>
-      <p:bldP build="whole" bldLvl="1" animBg="1" rev="0" advAuto="0" spid="251" grpId="17"/>
-      <p:bldP build="whole" bldLvl="1" animBg="1" rev="0" advAuto="0" spid="271" grpId="7"/>
-      <p:bldP build="whole" bldLvl="1" animBg="1" rev="0" advAuto="0" spid="246" grpId="23"/>
     </p:bldLst>
   </p:timing>
 </p:sld>
@@ -40498,17 +40570,17 @@
       </p:par>
     </p:tnLst>
     <p:bldLst>
+      <p:bldP build="whole" bldLvl="1" animBg="1" rev="0" advAuto="0" spid="328" grpId="9"/>
+      <p:bldP build="p" bldLvl="5" animBg="1" rev="0" advAuto="0" spid="283" grpId="11"/>
+      <p:bldP build="whole" bldLvl="1" animBg="1" rev="0" advAuto="0" spid="303" grpId="6"/>
+      <p:bldP build="whole" bldLvl="1" animBg="1" rev="0" advAuto="0" spid="328" grpId="4"/>
+      <p:bldP build="whole" bldLvl="1" animBg="1" rev="0" advAuto="0" spid="325" grpId="3"/>
+      <p:bldP build="whole" bldLvl="1" animBg="1" rev="0" advAuto="0" spid="322" grpId="2"/>
+      <p:bldP build="whole" bldLvl="1" animBg="1" rev="0" advAuto="0" spid="294" grpId="10"/>
       <p:bldP build="whole" bldLvl="1" animBg="1" rev="0" advAuto="0" spid="322" grpId="5"/>
       <p:bldP build="whole" bldLvl="1" animBg="1" rev="0" advAuto="0" spid="319" grpId="1"/>
-      <p:bldP build="whole" bldLvl="1" animBg="1" rev="0" advAuto="0" spid="328" grpId="4"/>
-      <p:bldP build="whole" bldLvl="1" animBg="1" rev="0" advAuto="0" spid="294" grpId="10"/>
-      <p:bldP build="p" bldLvl="5" animBg="1" rev="0" advAuto="0" spid="283" grpId="11"/>
-      <p:bldP build="whole" bldLvl="1" animBg="1" rev="0" advAuto="0" spid="328" grpId="9"/>
-      <p:bldP build="whole" bldLvl="1" animBg="1" rev="0" advAuto="0" spid="325" grpId="3"/>
+      <p:bldP build="whole" bldLvl="1" animBg="1" rev="0" advAuto="0" spid="325" grpId="7"/>
       <p:bldP build="whole" bldLvl="1" animBg="1" rev="0" advAuto="0" spid="298" grpId="8"/>
-      <p:bldP build="whole" bldLvl="1" animBg="1" rev="0" advAuto="0" spid="303" grpId="6"/>
-      <p:bldP build="whole" bldLvl="1" animBg="1" rev="0" advAuto="0" spid="322" grpId="2"/>
-      <p:bldP build="whole" bldLvl="1" animBg="1" rev="0" advAuto="0" spid="325" grpId="7"/>
     </p:bldLst>
   </p:timing>
 </p:sld>

</xml_diff>